<commit_message>
Fixed a typo in the the quantification introduction where chemical labeling was used twice in the same figure instead of label free.
</commit_message>
<xml_diff>
--- a/wiki/tutorial/2 - Quantification/2.0 - Introduction/illustrations/illustrations.pptx
+++ b/wiki/tutorial/2 - Quantification/2.0 - Introduction/illustrations/illustrations.pptx
@@ -289,7 +289,8 @@
           <a:p>
             <a:fld id="{BB56636F-9E64-48A9-A0E8-D6911EA208CE}" type="datetimeFigureOut">
               <a:rPr lang="nb-NO" smtClean="0"/>
-              <a:t>12.06.2013</a:t>
+              <a:pPr/>
+              <a:t>05.07.2013</a:t>
             </a:fld>
             <a:endParaRPr lang="nb-NO"/>
           </a:p>
@@ -331,6 +332,7 @@
           <a:p>
             <a:fld id="{FAEFB388-42AA-4DF2-851A-CCA4A06B24AA}" type="slidenum">
               <a:rPr lang="nb-NO" smtClean="0"/>
+              <a:pPr/>
               <a:t>‹#›</a:t>
             </a:fld>
             <a:endParaRPr lang="nb-NO"/>
@@ -454,7 +456,8 @@
           <a:p>
             <a:fld id="{BB56636F-9E64-48A9-A0E8-D6911EA208CE}" type="datetimeFigureOut">
               <a:rPr lang="nb-NO" smtClean="0"/>
-              <a:t>12.06.2013</a:t>
+              <a:pPr/>
+              <a:t>05.07.2013</a:t>
             </a:fld>
             <a:endParaRPr lang="nb-NO"/>
           </a:p>
@@ -496,6 +499,7 @@
           <a:p>
             <a:fld id="{FAEFB388-42AA-4DF2-851A-CCA4A06B24AA}" type="slidenum">
               <a:rPr lang="nb-NO" smtClean="0"/>
+              <a:pPr/>
               <a:t>‹#›</a:t>
             </a:fld>
             <a:endParaRPr lang="nb-NO"/>
@@ -629,7 +633,8 @@
           <a:p>
             <a:fld id="{BB56636F-9E64-48A9-A0E8-D6911EA208CE}" type="datetimeFigureOut">
               <a:rPr lang="nb-NO" smtClean="0"/>
-              <a:t>12.06.2013</a:t>
+              <a:pPr/>
+              <a:t>05.07.2013</a:t>
             </a:fld>
             <a:endParaRPr lang="nb-NO"/>
           </a:p>
@@ -671,6 +676,7 @@
           <a:p>
             <a:fld id="{FAEFB388-42AA-4DF2-851A-CCA4A06B24AA}" type="slidenum">
               <a:rPr lang="nb-NO" smtClean="0"/>
+              <a:pPr/>
               <a:t>‹#›</a:t>
             </a:fld>
             <a:endParaRPr lang="nb-NO"/>
@@ -794,7 +800,8 @@
           <a:p>
             <a:fld id="{BB56636F-9E64-48A9-A0E8-D6911EA208CE}" type="datetimeFigureOut">
               <a:rPr lang="nb-NO" smtClean="0"/>
-              <a:t>12.06.2013</a:t>
+              <a:pPr/>
+              <a:t>05.07.2013</a:t>
             </a:fld>
             <a:endParaRPr lang="nb-NO"/>
           </a:p>
@@ -836,6 +843,7 @@
           <a:p>
             <a:fld id="{FAEFB388-42AA-4DF2-851A-CCA4A06B24AA}" type="slidenum">
               <a:rPr lang="nb-NO" smtClean="0"/>
+              <a:pPr/>
               <a:t>‹#›</a:t>
             </a:fld>
             <a:endParaRPr lang="nb-NO"/>
@@ -1035,7 +1043,8 @@
           <a:p>
             <a:fld id="{BB56636F-9E64-48A9-A0E8-D6911EA208CE}" type="datetimeFigureOut">
               <a:rPr lang="nb-NO" smtClean="0"/>
-              <a:t>12.06.2013</a:t>
+              <a:pPr/>
+              <a:t>05.07.2013</a:t>
             </a:fld>
             <a:endParaRPr lang="nb-NO"/>
           </a:p>
@@ -1077,6 +1086,7 @@
           <a:p>
             <a:fld id="{FAEFB388-42AA-4DF2-851A-CCA4A06B24AA}" type="slidenum">
               <a:rPr lang="nb-NO" smtClean="0"/>
+              <a:pPr/>
               <a:t>‹#›</a:t>
             </a:fld>
             <a:endParaRPr lang="nb-NO"/>
@@ -1318,7 +1328,8 @@
           <a:p>
             <a:fld id="{BB56636F-9E64-48A9-A0E8-D6911EA208CE}" type="datetimeFigureOut">
               <a:rPr lang="nb-NO" smtClean="0"/>
-              <a:t>12.06.2013</a:t>
+              <a:pPr/>
+              <a:t>05.07.2013</a:t>
             </a:fld>
             <a:endParaRPr lang="nb-NO"/>
           </a:p>
@@ -1360,6 +1371,7 @@
           <a:p>
             <a:fld id="{FAEFB388-42AA-4DF2-851A-CCA4A06B24AA}" type="slidenum">
               <a:rPr lang="nb-NO" smtClean="0"/>
+              <a:pPr/>
               <a:t>‹#›</a:t>
             </a:fld>
             <a:endParaRPr lang="nb-NO"/>
@@ -1735,7 +1747,8 @@
           <a:p>
             <a:fld id="{BB56636F-9E64-48A9-A0E8-D6911EA208CE}" type="datetimeFigureOut">
               <a:rPr lang="nb-NO" smtClean="0"/>
-              <a:t>12.06.2013</a:t>
+              <a:pPr/>
+              <a:t>05.07.2013</a:t>
             </a:fld>
             <a:endParaRPr lang="nb-NO"/>
           </a:p>
@@ -1777,6 +1790,7 @@
           <a:p>
             <a:fld id="{FAEFB388-42AA-4DF2-851A-CCA4A06B24AA}" type="slidenum">
               <a:rPr lang="nb-NO" smtClean="0"/>
+              <a:pPr/>
               <a:t>‹#›</a:t>
             </a:fld>
             <a:endParaRPr lang="nb-NO"/>
@@ -1848,7 +1862,8 @@
           <a:p>
             <a:fld id="{BB56636F-9E64-48A9-A0E8-D6911EA208CE}" type="datetimeFigureOut">
               <a:rPr lang="nb-NO" smtClean="0"/>
-              <a:t>12.06.2013</a:t>
+              <a:pPr/>
+              <a:t>05.07.2013</a:t>
             </a:fld>
             <a:endParaRPr lang="nb-NO"/>
           </a:p>
@@ -1890,6 +1905,7 @@
           <a:p>
             <a:fld id="{FAEFB388-42AA-4DF2-851A-CCA4A06B24AA}" type="slidenum">
               <a:rPr lang="nb-NO" smtClean="0"/>
+              <a:pPr/>
               <a:t>‹#›</a:t>
             </a:fld>
             <a:endParaRPr lang="nb-NO"/>
@@ -1938,7 +1954,8 @@
           <a:p>
             <a:fld id="{BB56636F-9E64-48A9-A0E8-D6911EA208CE}" type="datetimeFigureOut">
               <a:rPr lang="nb-NO" smtClean="0"/>
-              <a:t>12.06.2013</a:t>
+              <a:pPr/>
+              <a:t>05.07.2013</a:t>
             </a:fld>
             <a:endParaRPr lang="nb-NO"/>
           </a:p>
@@ -1980,6 +1997,7 @@
           <a:p>
             <a:fld id="{FAEFB388-42AA-4DF2-851A-CCA4A06B24AA}" type="slidenum">
               <a:rPr lang="nb-NO" smtClean="0"/>
+              <a:pPr/>
               <a:t>‹#›</a:t>
             </a:fld>
             <a:endParaRPr lang="nb-NO"/>
@@ -2210,7 +2228,8 @@
           <a:p>
             <a:fld id="{BB56636F-9E64-48A9-A0E8-D6911EA208CE}" type="datetimeFigureOut">
               <a:rPr lang="nb-NO" smtClean="0"/>
-              <a:t>12.06.2013</a:t>
+              <a:pPr/>
+              <a:t>05.07.2013</a:t>
             </a:fld>
             <a:endParaRPr lang="nb-NO"/>
           </a:p>
@@ -2252,6 +2271,7 @@
           <a:p>
             <a:fld id="{FAEFB388-42AA-4DF2-851A-CCA4A06B24AA}" type="slidenum">
               <a:rPr lang="nb-NO" smtClean="0"/>
+              <a:pPr/>
               <a:t>‹#›</a:t>
             </a:fld>
             <a:endParaRPr lang="nb-NO"/>
@@ -2458,7 +2478,8 @@
           <a:p>
             <a:fld id="{BB56636F-9E64-48A9-A0E8-D6911EA208CE}" type="datetimeFigureOut">
               <a:rPr lang="nb-NO" smtClean="0"/>
-              <a:t>12.06.2013</a:t>
+              <a:pPr/>
+              <a:t>05.07.2013</a:t>
             </a:fld>
             <a:endParaRPr lang="nb-NO"/>
           </a:p>
@@ -2500,6 +2521,7 @@
           <a:p>
             <a:fld id="{FAEFB388-42AA-4DF2-851A-CCA4A06B24AA}" type="slidenum">
               <a:rPr lang="nb-NO" smtClean="0"/>
+              <a:pPr/>
               <a:t>‹#›</a:t>
             </a:fld>
             <a:endParaRPr lang="nb-NO"/>
@@ -2666,7 +2688,8 @@
           <a:p>
             <a:fld id="{BB56636F-9E64-48A9-A0E8-D6911EA208CE}" type="datetimeFigureOut">
               <a:rPr lang="nb-NO" smtClean="0"/>
-              <a:t>12.06.2013</a:t>
+              <a:pPr/>
+              <a:t>05.07.2013</a:t>
             </a:fld>
             <a:endParaRPr lang="nb-NO"/>
           </a:p>
@@ -2744,6 +2767,7 @@
           <a:p>
             <a:fld id="{FAEFB388-42AA-4DF2-851A-CCA4A06B24AA}" type="slidenum">
               <a:rPr lang="nb-NO" smtClean="0"/>
+              <a:pPr/>
               <a:t>‹#›</a:t>
             </a:fld>
             <a:endParaRPr lang="nb-NO"/>
@@ -3167,7 +3191,7 @@
             <a:lstStyle/>
             <a:p>
               <a:pPr algn="ctr"/>
-              <a:endParaRPr lang="nb-NO"/>
+              <a:endParaRPr lang="nb-NO" dirty="0"/>
             </a:p>
           </p:txBody>
         </p:sp>
@@ -3211,7 +3235,7 @@
             <a:lstStyle/>
             <a:p>
               <a:pPr algn="ctr"/>
-              <a:endParaRPr lang="nb-NO"/>
+              <a:endParaRPr lang="nb-NO" dirty="0"/>
             </a:p>
           </p:txBody>
         </p:sp>
@@ -3255,7 +3279,7 @@
             <a:lstStyle/>
             <a:p>
               <a:pPr algn="ctr"/>
-              <a:endParaRPr lang="nb-NO"/>
+              <a:endParaRPr lang="nb-NO" dirty="0"/>
             </a:p>
           </p:txBody>
         </p:sp>
@@ -3299,7 +3323,7 @@
             <a:lstStyle/>
             <a:p>
               <a:pPr algn="ctr"/>
-              <a:endParaRPr lang="nb-NO"/>
+              <a:endParaRPr lang="nb-NO" dirty="0"/>
             </a:p>
           </p:txBody>
         </p:sp>
@@ -3346,7 +3370,7 @@
             <a:lstStyle/>
             <a:p>
               <a:pPr algn="ctr"/>
-              <a:endParaRPr lang="nb-NO"/>
+              <a:endParaRPr lang="nb-NO" dirty="0"/>
             </a:p>
           </p:txBody>
         </p:sp>
@@ -3390,7 +3414,7 @@
             <a:lstStyle/>
             <a:p>
               <a:pPr algn="ctr"/>
-              <a:endParaRPr lang="nb-NO"/>
+              <a:endParaRPr lang="nb-NO" dirty="0"/>
             </a:p>
           </p:txBody>
         </p:sp>
@@ -3554,7 +3578,7 @@
             <a:lstStyle/>
             <a:p>
               <a:pPr algn="ctr"/>
-              <a:endParaRPr lang="nb-NO"/>
+              <a:endParaRPr lang="nb-NO" dirty="0"/>
             </a:p>
           </p:txBody>
         </p:sp>
@@ -3795,7 +3819,7 @@
             <a:lstStyle/>
             <a:p>
               <a:pPr algn="ctr"/>
-              <a:endParaRPr lang="nb-NO">
+              <a:endParaRPr lang="nb-NO" dirty="0">
                 <a:solidFill>
                   <a:schemeClr val="tx1"/>
                 </a:solidFill>
@@ -3917,7 +3941,7 @@
             <a:lstStyle/>
             <a:p>
               <a:pPr algn="ctr"/>
-              <a:endParaRPr lang="nb-NO"/>
+              <a:endParaRPr lang="nb-NO" dirty="0"/>
             </a:p>
           </p:txBody>
         </p:sp>
@@ -3965,7 +3989,7 @@
             <a:lstStyle/>
             <a:p>
               <a:pPr algn="ctr"/>
-              <a:endParaRPr lang="nb-NO"/>
+              <a:endParaRPr lang="nb-NO" dirty="0"/>
             </a:p>
           </p:txBody>
         </p:sp>
@@ -4013,7 +4037,7 @@
             <a:lstStyle/>
             <a:p>
               <a:pPr algn="ctr"/>
-              <a:endParaRPr lang="nb-NO"/>
+              <a:endParaRPr lang="nb-NO" dirty="0"/>
             </a:p>
           </p:txBody>
         </p:sp>
@@ -4064,7 +4088,7 @@
             <a:lstStyle/>
             <a:p>
               <a:pPr algn="ctr"/>
-              <a:endParaRPr lang="nb-NO"/>
+              <a:endParaRPr lang="nb-NO" dirty="0"/>
             </a:p>
           </p:txBody>
         </p:sp>
@@ -4112,7 +4136,7 @@
             <a:lstStyle/>
             <a:p>
               <a:pPr algn="ctr"/>
-              <a:endParaRPr lang="nb-NO"/>
+              <a:endParaRPr lang="nb-NO" dirty="0"/>
             </a:p>
           </p:txBody>
         </p:sp>
@@ -4160,7 +4184,7 @@
             <a:lstStyle/>
             <a:p>
               <a:pPr algn="ctr"/>
-              <a:endParaRPr lang="nb-NO"/>
+              <a:endParaRPr lang="nb-NO" dirty="0"/>
             </a:p>
           </p:txBody>
         </p:sp>
@@ -4325,7 +4349,7 @@
               <a:lstStyle/>
               <a:p>
                 <a:pPr algn="ctr"/>
-                <a:endParaRPr lang="nb-NO"/>
+                <a:endParaRPr lang="nb-NO" dirty="0"/>
               </a:p>
             </p:txBody>
           </p:sp>
@@ -4368,7 +4392,7 @@
               <a:lstStyle/>
               <a:p>
                 <a:pPr algn="ctr"/>
-                <a:endParaRPr lang="nb-NO"/>
+                <a:endParaRPr lang="nb-NO" dirty="0"/>
               </a:p>
             </p:txBody>
           </p:sp>
@@ -4411,7 +4435,7 @@
               <a:lstStyle/>
               <a:p>
                 <a:pPr algn="ctr"/>
-                <a:endParaRPr lang="nb-NO"/>
+                <a:endParaRPr lang="nb-NO" dirty="0"/>
               </a:p>
             </p:txBody>
           </p:sp>
@@ -4454,7 +4478,7 @@
               <a:lstStyle/>
               <a:p>
                 <a:pPr algn="ctr"/>
-                <a:endParaRPr lang="nb-NO"/>
+                <a:endParaRPr lang="nb-NO" dirty="0"/>
               </a:p>
             </p:txBody>
           </p:sp>
@@ -4760,7 +4784,7 @@
               <a:blip r:embed="rId2" cstate="print">
                 <a:extLst>
                   <a:ext uri="{28A0092B-C50C-407E-A947-70E740481C1C}">
-                    <a14:useLocalDpi xmlns:a14="http://schemas.microsoft.com/office/drawing/2010/main" val="0"/>
+                    <a14:useLocalDpi xmlns:a14="http://schemas.microsoft.com/office/drawing/2010/main" xmlns="" val="0"/>
                   </a:ext>
                 </a:extLst>
               </a:blip>
@@ -4787,7 +4811,7 @@
               </a:effectLst>
               <a:extLst>
                 <a:ext uri="{909E8E84-426E-40DD-AFC4-6F175D3DCCD1}">
-                  <a14:hiddenFill xmlns:a14="http://schemas.microsoft.com/office/drawing/2010/main">
+                  <a14:hiddenFill xmlns:a14="http://schemas.microsoft.com/office/drawing/2010/main" xmlns="">
                     <a:solidFill>
                       <a:srgbClr val="FFFFFF"/>
                     </a:solidFill>
@@ -4856,7 +4880,7 @@
               <a:blip r:embed="rId2" cstate="print">
                 <a:extLst>
                   <a:ext uri="{28A0092B-C50C-407E-A947-70E740481C1C}">
-                    <a14:useLocalDpi xmlns:a14="http://schemas.microsoft.com/office/drawing/2010/main" val="0"/>
+                    <a14:useLocalDpi xmlns:a14="http://schemas.microsoft.com/office/drawing/2010/main" xmlns="" val="0"/>
                   </a:ext>
                 </a:extLst>
               </a:blip>
@@ -4883,7 +4907,7 @@
               </a:effectLst>
               <a:extLst>
                 <a:ext uri="{909E8E84-426E-40DD-AFC4-6F175D3DCCD1}">
-                  <a14:hiddenFill xmlns:a14="http://schemas.microsoft.com/office/drawing/2010/main">
+                  <a14:hiddenFill xmlns:a14="http://schemas.microsoft.com/office/drawing/2010/main" xmlns="">
                     <a:solidFill>
                       <a:srgbClr val="FFFFFF"/>
                     </a:solidFill>
@@ -4952,7 +4976,7 @@
               <a:blip r:embed="rId2" cstate="print">
                 <a:extLst>
                   <a:ext uri="{28A0092B-C50C-407E-A947-70E740481C1C}">
-                    <a14:useLocalDpi xmlns:a14="http://schemas.microsoft.com/office/drawing/2010/main" val="0"/>
+                    <a14:useLocalDpi xmlns:a14="http://schemas.microsoft.com/office/drawing/2010/main" xmlns="" val="0"/>
                   </a:ext>
                 </a:extLst>
               </a:blip>
@@ -4979,7 +5003,7 @@
               </a:effectLst>
               <a:extLst>
                 <a:ext uri="{909E8E84-426E-40DD-AFC4-6F175D3DCCD1}">
-                  <a14:hiddenFill xmlns:a14="http://schemas.microsoft.com/office/drawing/2010/main">
+                  <a14:hiddenFill xmlns:a14="http://schemas.microsoft.com/office/drawing/2010/main" xmlns="">
                     <a:solidFill>
                       <a:srgbClr val="FFFFFF"/>
                     </a:solidFill>
@@ -5048,7 +5072,7 @@
               <a:blip r:embed="rId2" cstate="print">
                 <a:extLst>
                   <a:ext uri="{28A0092B-C50C-407E-A947-70E740481C1C}">
-                    <a14:useLocalDpi xmlns:a14="http://schemas.microsoft.com/office/drawing/2010/main" val="0"/>
+                    <a14:useLocalDpi xmlns:a14="http://schemas.microsoft.com/office/drawing/2010/main" xmlns="" val="0"/>
                   </a:ext>
                 </a:extLst>
               </a:blip>
@@ -5075,7 +5099,7 @@
               </a:effectLst>
               <a:extLst>
                 <a:ext uri="{909E8E84-426E-40DD-AFC4-6F175D3DCCD1}">
-                  <a14:hiddenFill xmlns:a14="http://schemas.microsoft.com/office/drawing/2010/main">
+                  <a14:hiddenFill xmlns:a14="http://schemas.microsoft.com/office/drawing/2010/main" xmlns="">
                     <a:solidFill>
                       <a:srgbClr val="FFFFFF"/>
                     </a:solidFill>
@@ -5097,7 +5121,7 @@
             <a:blip r:embed="rId3" cstate="print">
               <a:extLst>
                 <a:ext uri="{28A0092B-C50C-407E-A947-70E740481C1C}">
-                  <a14:useLocalDpi xmlns:a14="http://schemas.microsoft.com/office/drawing/2010/main" val="0"/>
+                  <a14:useLocalDpi xmlns:a14="http://schemas.microsoft.com/office/drawing/2010/main" xmlns="" val="0"/>
                 </a:ext>
               </a:extLst>
             </a:blip>
@@ -5117,7 +5141,7 @@
             <a:noFill/>
             <a:extLst>
               <a:ext uri="{909E8E84-426E-40DD-AFC4-6F175D3DCCD1}">
-                <a14:hiddenFill xmlns:a14="http://schemas.microsoft.com/office/drawing/2010/main">
+                <a14:hiddenFill xmlns:a14="http://schemas.microsoft.com/office/drawing/2010/main" xmlns="">
                   <a:solidFill>
                     <a:srgbClr val="FFFFFF"/>
                   </a:solidFill>
@@ -5138,7 +5162,7 @@
             <a:blip r:embed="rId4" cstate="print">
               <a:extLst>
                 <a:ext uri="{28A0092B-C50C-407E-A947-70E740481C1C}">
-                  <a14:useLocalDpi xmlns:a14="http://schemas.microsoft.com/office/drawing/2010/main" val="0"/>
+                  <a14:useLocalDpi xmlns:a14="http://schemas.microsoft.com/office/drawing/2010/main" xmlns="" val="0"/>
                 </a:ext>
               </a:extLst>
             </a:blip>
@@ -5158,7 +5182,7 @@
             <a:noFill/>
             <a:extLst>
               <a:ext uri="{909E8E84-426E-40DD-AFC4-6F175D3DCCD1}">
-                <a14:hiddenFill xmlns:a14="http://schemas.microsoft.com/office/drawing/2010/main">
+                <a14:hiddenFill xmlns:a14="http://schemas.microsoft.com/office/drawing/2010/main" xmlns="">
                   <a:solidFill>
                     <a:srgbClr val="FFFFFF"/>
                   </a:solidFill>
@@ -5179,7 +5203,7 @@
             <a:blip r:embed="rId5" cstate="print">
               <a:extLst>
                 <a:ext uri="{28A0092B-C50C-407E-A947-70E740481C1C}">
-                  <a14:useLocalDpi xmlns:a14="http://schemas.microsoft.com/office/drawing/2010/main" val="0"/>
+                  <a14:useLocalDpi xmlns:a14="http://schemas.microsoft.com/office/drawing/2010/main" xmlns="" val="0"/>
                 </a:ext>
               </a:extLst>
             </a:blip>
@@ -5199,7 +5223,7 @@
             <a:noFill/>
             <a:extLst>
               <a:ext uri="{909E8E84-426E-40DD-AFC4-6F175D3DCCD1}">
-                <a14:hiddenFill xmlns:a14="http://schemas.microsoft.com/office/drawing/2010/main">
+                <a14:hiddenFill xmlns:a14="http://schemas.microsoft.com/office/drawing/2010/main" xmlns="">
                   <a:solidFill>
                     <a:srgbClr val="FFFFFF"/>
                   </a:solidFill>
@@ -5220,7 +5244,7 @@
             <a:blip r:embed="rId6" cstate="print">
               <a:extLst>
                 <a:ext uri="{28A0092B-C50C-407E-A947-70E740481C1C}">
-                  <a14:useLocalDpi xmlns:a14="http://schemas.microsoft.com/office/drawing/2010/main" val="0"/>
+                  <a14:useLocalDpi xmlns:a14="http://schemas.microsoft.com/office/drawing/2010/main" xmlns="" val="0"/>
                 </a:ext>
               </a:extLst>
             </a:blip>
@@ -5240,7 +5264,7 @@
             <a:noFill/>
             <a:extLst>
               <a:ext uri="{909E8E84-426E-40DD-AFC4-6F175D3DCCD1}">
-                <a14:hiddenFill xmlns:a14="http://schemas.microsoft.com/office/drawing/2010/main">
+                <a14:hiddenFill xmlns:a14="http://schemas.microsoft.com/office/drawing/2010/main" xmlns="">
                   <a:solidFill>
                     <a:srgbClr val="FFFFFF"/>
                   </a:solidFill>
@@ -5290,7 +5314,7 @@
               <a:blip r:embed="rId7" cstate="print">
                 <a:extLst>
                   <a:ext uri="{28A0092B-C50C-407E-A947-70E740481C1C}">
-                    <a14:useLocalDpi xmlns:a14="http://schemas.microsoft.com/office/drawing/2010/main" val="0"/>
+                    <a14:useLocalDpi xmlns:a14="http://schemas.microsoft.com/office/drawing/2010/main" xmlns="" val="0"/>
                   </a:ext>
                 </a:extLst>
               </a:blip>
@@ -5317,7 +5341,7 @@
               </a:effectLst>
               <a:extLst>
                 <a:ext uri="{909E8E84-426E-40DD-AFC4-6F175D3DCCD1}">
-                  <a14:hiddenFill xmlns:a14="http://schemas.microsoft.com/office/drawing/2010/main">
+                  <a14:hiddenFill xmlns:a14="http://schemas.microsoft.com/office/drawing/2010/main" xmlns="">
                     <a:solidFill>
                       <a:srgbClr val="FFFFFF"/>
                     </a:solidFill>
@@ -5386,7 +5410,7 @@
               <a:blip r:embed="rId7" cstate="print">
                 <a:extLst>
                   <a:ext uri="{28A0092B-C50C-407E-A947-70E740481C1C}">
-                    <a14:useLocalDpi xmlns:a14="http://schemas.microsoft.com/office/drawing/2010/main" val="0"/>
+                    <a14:useLocalDpi xmlns:a14="http://schemas.microsoft.com/office/drawing/2010/main" xmlns="" val="0"/>
                   </a:ext>
                 </a:extLst>
               </a:blip>
@@ -5413,7 +5437,7 @@
               </a:effectLst>
               <a:extLst>
                 <a:ext uri="{909E8E84-426E-40DD-AFC4-6F175D3DCCD1}">
-                  <a14:hiddenFill xmlns:a14="http://schemas.microsoft.com/office/drawing/2010/main">
+                  <a14:hiddenFill xmlns:a14="http://schemas.microsoft.com/office/drawing/2010/main" xmlns="">
                     <a:solidFill>
                       <a:srgbClr val="FFFFFF"/>
                     </a:solidFill>
@@ -5482,7 +5506,7 @@
               <a:blip r:embed="rId7" cstate="print">
                 <a:extLst>
                   <a:ext uri="{28A0092B-C50C-407E-A947-70E740481C1C}">
-                    <a14:useLocalDpi xmlns:a14="http://schemas.microsoft.com/office/drawing/2010/main" val="0"/>
+                    <a14:useLocalDpi xmlns:a14="http://schemas.microsoft.com/office/drawing/2010/main" xmlns="" val="0"/>
                   </a:ext>
                 </a:extLst>
               </a:blip>
@@ -5509,7 +5533,7 @@
               </a:effectLst>
               <a:extLst>
                 <a:ext uri="{909E8E84-426E-40DD-AFC4-6F175D3DCCD1}">
-                  <a14:hiddenFill xmlns:a14="http://schemas.microsoft.com/office/drawing/2010/main">
+                  <a14:hiddenFill xmlns:a14="http://schemas.microsoft.com/office/drawing/2010/main" xmlns="">
                     <a:solidFill>
                       <a:srgbClr val="FFFFFF"/>
                     </a:solidFill>
@@ -5578,7 +5602,7 @@
               <a:blip r:embed="rId7" cstate="print">
                 <a:extLst>
                   <a:ext uri="{28A0092B-C50C-407E-A947-70E740481C1C}">
-                    <a14:useLocalDpi xmlns:a14="http://schemas.microsoft.com/office/drawing/2010/main" val="0"/>
+                    <a14:useLocalDpi xmlns:a14="http://schemas.microsoft.com/office/drawing/2010/main" xmlns="" val="0"/>
                   </a:ext>
                 </a:extLst>
               </a:blip>
@@ -5605,7 +5629,7 @@
               </a:effectLst>
               <a:extLst>
                 <a:ext uri="{909E8E84-426E-40DD-AFC4-6F175D3DCCD1}">
-                  <a14:hiddenFill xmlns:a14="http://schemas.microsoft.com/office/drawing/2010/main">
+                  <a14:hiddenFill xmlns:a14="http://schemas.microsoft.com/office/drawing/2010/main" xmlns="">
                     <a:solidFill>
                       <a:srgbClr val="FFFFFF"/>
                     </a:solidFill>
@@ -5627,7 +5651,7 @@
             <a:blip r:embed="rId8" cstate="print">
               <a:extLst>
                 <a:ext uri="{28A0092B-C50C-407E-A947-70E740481C1C}">
-                  <a14:useLocalDpi xmlns:a14="http://schemas.microsoft.com/office/drawing/2010/main" val="0"/>
+                  <a14:useLocalDpi xmlns:a14="http://schemas.microsoft.com/office/drawing/2010/main" xmlns="" val="0"/>
                 </a:ext>
               </a:extLst>
             </a:blip>
@@ -5647,7 +5671,7 @@
             <a:noFill/>
             <a:extLst>
               <a:ext uri="{909E8E84-426E-40DD-AFC4-6F175D3DCCD1}">
-                <a14:hiddenFill xmlns:a14="http://schemas.microsoft.com/office/drawing/2010/main">
+                <a14:hiddenFill xmlns:a14="http://schemas.microsoft.com/office/drawing/2010/main" xmlns="">
                   <a:solidFill>
                     <a:srgbClr val="FFFFFF"/>
                   </a:solidFill>
@@ -5668,7 +5692,7 @@
             <a:blip r:embed="rId9" cstate="print">
               <a:extLst>
                 <a:ext uri="{28A0092B-C50C-407E-A947-70E740481C1C}">
-                  <a14:useLocalDpi xmlns:a14="http://schemas.microsoft.com/office/drawing/2010/main" val="0"/>
+                  <a14:useLocalDpi xmlns:a14="http://schemas.microsoft.com/office/drawing/2010/main" xmlns="" val="0"/>
                 </a:ext>
               </a:extLst>
             </a:blip>
@@ -5688,7 +5712,7 @@
             <a:noFill/>
             <a:extLst>
               <a:ext uri="{909E8E84-426E-40DD-AFC4-6F175D3DCCD1}">
-                <a14:hiddenFill xmlns:a14="http://schemas.microsoft.com/office/drawing/2010/main">
+                <a14:hiddenFill xmlns:a14="http://schemas.microsoft.com/office/drawing/2010/main" xmlns="">
                   <a:solidFill>
                     <a:srgbClr val="FFFFFF"/>
                   </a:solidFill>
@@ -5709,7 +5733,7 @@
             <a:blip r:embed="rId10" cstate="print">
               <a:extLst>
                 <a:ext uri="{28A0092B-C50C-407E-A947-70E740481C1C}">
-                  <a14:useLocalDpi xmlns:a14="http://schemas.microsoft.com/office/drawing/2010/main" val="0"/>
+                  <a14:useLocalDpi xmlns:a14="http://schemas.microsoft.com/office/drawing/2010/main" xmlns="" val="0"/>
                 </a:ext>
               </a:extLst>
             </a:blip>
@@ -5729,7 +5753,7 @@
             <a:noFill/>
             <a:extLst>
               <a:ext uri="{909E8E84-426E-40DD-AFC4-6F175D3DCCD1}">
-                <a14:hiddenFill xmlns:a14="http://schemas.microsoft.com/office/drawing/2010/main">
+                <a14:hiddenFill xmlns:a14="http://schemas.microsoft.com/office/drawing/2010/main" xmlns="">
                   <a:solidFill>
                     <a:srgbClr val="FFFFFF"/>
                   </a:solidFill>
@@ -5750,7 +5774,7 @@
             <a:blip r:embed="rId11" cstate="print">
               <a:extLst>
                 <a:ext uri="{28A0092B-C50C-407E-A947-70E740481C1C}">
-                  <a14:useLocalDpi xmlns:a14="http://schemas.microsoft.com/office/drawing/2010/main" val="0"/>
+                  <a14:useLocalDpi xmlns:a14="http://schemas.microsoft.com/office/drawing/2010/main" xmlns="" val="0"/>
                 </a:ext>
               </a:extLst>
             </a:blip>
@@ -5770,7 +5794,7 @@
             <a:noFill/>
             <a:extLst>
               <a:ext uri="{909E8E84-426E-40DD-AFC4-6F175D3DCCD1}">
-                <a14:hiddenFill xmlns:a14="http://schemas.microsoft.com/office/drawing/2010/main">
+                <a14:hiddenFill xmlns:a14="http://schemas.microsoft.com/office/drawing/2010/main" xmlns="">
                   <a:solidFill>
                     <a:srgbClr val="FFFFFF"/>
                   </a:solidFill>
@@ -5783,7 +5807,7 @@
     </p:spTree>
     <p:extLst>
       <p:ext uri="{BB962C8B-B14F-4D97-AF65-F5344CB8AC3E}">
-        <p14:creationId xmlns:p14="http://schemas.microsoft.com/office/powerpoint/2010/main" val="3654327765"/>
+        <p14:creationId xmlns:p14="http://schemas.microsoft.com/office/powerpoint/2010/main" xmlns="" val="3654327765"/>
       </p:ext>
     </p:extLst>
   </p:cSld>
@@ -5852,7 +5876,7 @@
           <a:lstStyle/>
           <a:p>
             <a:pPr algn="ctr"/>
-            <a:endParaRPr lang="nb-NO"/>
+            <a:endParaRPr lang="nb-NO" dirty="0"/>
           </a:p>
         </p:txBody>
       </p:sp>
@@ -5989,7 +6013,7 @@
             <a:lstStyle/>
             <a:p>
               <a:pPr algn="ctr"/>
-              <a:endParaRPr lang="nb-NO"/>
+              <a:endParaRPr lang="nb-NO" dirty="0"/>
             </a:p>
           </p:txBody>
         </p:sp>
@@ -6033,7 +6057,7 @@
             <a:lstStyle/>
             <a:p>
               <a:pPr algn="ctr"/>
-              <a:endParaRPr lang="nb-NO"/>
+              <a:endParaRPr lang="nb-NO" dirty="0"/>
             </a:p>
           </p:txBody>
         </p:sp>
@@ -6077,7 +6101,7 @@
             <a:lstStyle/>
             <a:p>
               <a:pPr algn="ctr"/>
-              <a:endParaRPr lang="nb-NO"/>
+              <a:endParaRPr lang="nb-NO" dirty="0"/>
             </a:p>
           </p:txBody>
         </p:sp>
@@ -6121,7 +6145,7 @@
             <a:lstStyle/>
             <a:p>
               <a:pPr algn="ctr"/>
-              <a:endParaRPr lang="nb-NO"/>
+              <a:endParaRPr lang="nb-NO" dirty="0"/>
             </a:p>
           </p:txBody>
         </p:sp>
@@ -6168,7 +6192,7 @@
             <a:lstStyle/>
             <a:p>
               <a:pPr algn="ctr"/>
-              <a:endParaRPr lang="nb-NO"/>
+              <a:endParaRPr lang="nb-NO" dirty="0"/>
             </a:p>
           </p:txBody>
         </p:sp>
@@ -6212,7 +6236,7 @@
             <a:lstStyle/>
             <a:p>
               <a:pPr algn="ctr"/>
-              <a:endParaRPr lang="nb-NO"/>
+              <a:endParaRPr lang="nb-NO" dirty="0"/>
             </a:p>
           </p:txBody>
         </p:sp>
@@ -6376,7 +6400,7 @@
             <a:lstStyle/>
             <a:p>
               <a:pPr algn="ctr"/>
-              <a:endParaRPr lang="nb-NO"/>
+              <a:endParaRPr lang="nb-NO" dirty="0"/>
             </a:p>
           </p:txBody>
         </p:sp>
@@ -6619,7 +6643,7 @@
             <a:lstStyle/>
             <a:p>
               <a:pPr algn="ctr"/>
-              <a:endParaRPr lang="nb-NO">
+              <a:endParaRPr lang="nb-NO" dirty="0">
                 <a:solidFill>
                   <a:schemeClr val="tx1"/>
                 </a:solidFill>
@@ -6741,7 +6765,7 @@
             <a:lstStyle/>
             <a:p>
               <a:pPr algn="ctr"/>
-              <a:endParaRPr lang="nb-NO"/>
+              <a:endParaRPr lang="nb-NO" dirty="0"/>
             </a:p>
           </p:txBody>
         </p:sp>
@@ -6789,7 +6813,7 @@
             <a:lstStyle/>
             <a:p>
               <a:pPr algn="ctr"/>
-              <a:endParaRPr lang="nb-NO"/>
+              <a:endParaRPr lang="nb-NO" dirty="0"/>
             </a:p>
           </p:txBody>
         </p:sp>
@@ -6837,7 +6861,7 @@
             <a:lstStyle/>
             <a:p>
               <a:pPr algn="ctr"/>
-              <a:endParaRPr lang="nb-NO"/>
+              <a:endParaRPr lang="nb-NO" dirty="0"/>
             </a:p>
           </p:txBody>
         </p:sp>
@@ -6888,7 +6912,7 @@
             <a:lstStyle/>
             <a:p>
               <a:pPr algn="ctr"/>
-              <a:endParaRPr lang="nb-NO"/>
+              <a:endParaRPr lang="nb-NO" dirty="0"/>
             </a:p>
           </p:txBody>
         </p:sp>
@@ -6936,7 +6960,7 @@
             <a:lstStyle/>
             <a:p>
               <a:pPr algn="ctr"/>
-              <a:endParaRPr lang="nb-NO"/>
+              <a:endParaRPr lang="nb-NO" dirty="0"/>
             </a:p>
           </p:txBody>
         </p:sp>
@@ -6984,7 +7008,7 @@
             <a:lstStyle/>
             <a:p>
               <a:pPr algn="ctr"/>
-              <a:endParaRPr lang="nb-NO"/>
+              <a:endParaRPr lang="nb-NO" dirty="0"/>
             </a:p>
           </p:txBody>
         </p:sp>
@@ -7149,7 +7173,7 @@
               <a:lstStyle/>
               <a:p>
                 <a:pPr algn="ctr"/>
-                <a:endParaRPr lang="nb-NO"/>
+                <a:endParaRPr lang="nb-NO" dirty="0"/>
               </a:p>
             </p:txBody>
           </p:sp>
@@ -7192,7 +7216,7 @@
               <a:lstStyle/>
               <a:p>
                 <a:pPr algn="ctr"/>
-                <a:endParaRPr lang="nb-NO"/>
+                <a:endParaRPr lang="nb-NO" dirty="0"/>
               </a:p>
             </p:txBody>
           </p:sp>
@@ -7235,7 +7259,7 @@
               <a:lstStyle/>
               <a:p>
                 <a:pPr algn="ctr"/>
-                <a:endParaRPr lang="nb-NO"/>
+                <a:endParaRPr lang="nb-NO" dirty="0"/>
               </a:p>
             </p:txBody>
           </p:sp>
@@ -7278,7 +7302,7 @@
               <a:lstStyle/>
               <a:p>
                 <a:pPr algn="ctr"/>
-                <a:endParaRPr lang="nb-NO"/>
+                <a:endParaRPr lang="nb-NO" dirty="0"/>
               </a:p>
             </p:txBody>
           </p:sp>
@@ -7638,8 +7662,8 @@
         </p:nvSpPr>
         <p:spPr>
           <a:xfrm>
-            <a:off x="1921457" y="819601"/>
-            <a:ext cx="244827" cy="146448"/>
+            <a:off x="1921457" y="819600"/>
+            <a:ext cx="283407" cy="172959"/>
           </a:xfrm>
           <a:prstGeom prst="hexagon">
             <a:avLst/>
@@ -7682,7 +7706,17 @@
                   </a:schemeClr>
                 </a:solidFill>
               </a:rPr>
-              <a:t>+6 Da</a:t>
+              <a:t>+X </a:t>
+            </a:r>
+            <a:r>
+              <a:rPr lang="nb-NO" sz="600" b="1" dirty="0" smtClean="0">
+                <a:solidFill>
+                  <a:schemeClr val="accent4">
+                    <a:lumMod val="50000"/>
+                  </a:schemeClr>
+                </a:solidFill>
+              </a:rPr>
+              <a:t>Da</a:t>
             </a:r>
             <a:endParaRPr lang="nb-NO" sz="600" b="1" dirty="0">
               <a:solidFill>
@@ -7705,8 +7739,8 @@
         </p:nvCxnSpPr>
         <p:spPr>
           <a:xfrm flipH="1">
-            <a:off x="1870852" y="892825"/>
-            <a:ext cx="50605" cy="36707"/>
+            <a:off x="1870852" y="906080"/>
+            <a:ext cx="50605" cy="23452"/>
           </a:xfrm>
           <a:prstGeom prst="line">
             <a:avLst/>
@@ -7774,7 +7808,7 @@
               <a:blip r:embed="rId2" cstate="print">
                 <a:extLst>
                   <a:ext uri="{28A0092B-C50C-407E-A947-70E740481C1C}">
-                    <a14:useLocalDpi xmlns:a14="http://schemas.microsoft.com/office/drawing/2010/main" val="0"/>
+                    <a14:useLocalDpi xmlns:a14="http://schemas.microsoft.com/office/drawing/2010/main" xmlns="" val="0"/>
                   </a:ext>
                 </a:extLst>
               </a:blip>
@@ -7794,7 +7828,7 @@
               <a:noFill/>
               <a:extLst>
                 <a:ext uri="{909E8E84-426E-40DD-AFC4-6F175D3DCCD1}">
-                  <a14:hiddenFill xmlns:a14="http://schemas.microsoft.com/office/drawing/2010/main">
+                  <a14:hiddenFill xmlns:a14="http://schemas.microsoft.com/office/drawing/2010/main" xmlns="">
                     <a:solidFill>
                       <a:srgbClr val="FFFFFF"/>
                     </a:solidFill>
@@ -7863,7 +7897,7 @@
               <a:blip r:embed="rId2" cstate="print">
                 <a:extLst>
                   <a:ext uri="{28A0092B-C50C-407E-A947-70E740481C1C}">
-                    <a14:useLocalDpi xmlns:a14="http://schemas.microsoft.com/office/drawing/2010/main" val="0"/>
+                    <a14:useLocalDpi xmlns:a14="http://schemas.microsoft.com/office/drawing/2010/main" xmlns="" val="0"/>
                   </a:ext>
                 </a:extLst>
               </a:blip>
@@ -7883,7 +7917,7 @@
               <a:noFill/>
               <a:extLst>
                 <a:ext uri="{909E8E84-426E-40DD-AFC4-6F175D3DCCD1}">
-                  <a14:hiddenFill xmlns:a14="http://schemas.microsoft.com/office/drawing/2010/main">
+                  <a14:hiddenFill xmlns:a14="http://schemas.microsoft.com/office/drawing/2010/main" xmlns="">
                     <a:solidFill>
                       <a:srgbClr val="FFFFFF"/>
                     </a:solidFill>
@@ -7952,7 +7986,7 @@
               <a:blip r:embed="rId2" cstate="print">
                 <a:extLst>
                   <a:ext uri="{28A0092B-C50C-407E-A947-70E740481C1C}">
-                    <a14:useLocalDpi xmlns:a14="http://schemas.microsoft.com/office/drawing/2010/main" val="0"/>
+                    <a14:useLocalDpi xmlns:a14="http://schemas.microsoft.com/office/drawing/2010/main" xmlns="" val="0"/>
                   </a:ext>
                 </a:extLst>
               </a:blip>
@@ -7972,7 +8006,7 @@
               <a:noFill/>
               <a:extLst>
                 <a:ext uri="{909E8E84-426E-40DD-AFC4-6F175D3DCCD1}">
-                  <a14:hiddenFill xmlns:a14="http://schemas.microsoft.com/office/drawing/2010/main">
+                  <a14:hiddenFill xmlns:a14="http://schemas.microsoft.com/office/drawing/2010/main" xmlns="">
                     <a:solidFill>
                       <a:srgbClr val="FFFFFF"/>
                     </a:solidFill>
@@ -8041,7 +8075,7 @@
               <a:blip r:embed="rId2" cstate="print">
                 <a:extLst>
                   <a:ext uri="{28A0092B-C50C-407E-A947-70E740481C1C}">
-                    <a14:useLocalDpi xmlns:a14="http://schemas.microsoft.com/office/drawing/2010/main" val="0"/>
+                    <a14:useLocalDpi xmlns:a14="http://schemas.microsoft.com/office/drawing/2010/main" xmlns="" val="0"/>
                   </a:ext>
                 </a:extLst>
               </a:blip>
@@ -8061,7 +8095,7 @@
               <a:noFill/>
               <a:extLst>
                 <a:ext uri="{909E8E84-426E-40DD-AFC4-6F175D3DCCD1}">
-                  <a14:hiddenFill xmlns:a14="http://schemas.microsoft.com/office/drawing/2010/main">
+                  <a14:hiddenFill xmlns:a14="http://schemas.microsoft.com/office/drawing/2010/main" xmlns="">
                     <a:solidFill>
                       <a:srgbClr val="FFFFFF"/>
                     </a:solidFill>
@@ -8083,7 +8117,7 @@
             <a:blip r:embed="rId3" cstate="print">
               <a:extLst>
                 <a:ext uri="{28A0092B-C50C-407E-A947-70E740481C1C}">
-                  <a14:useLocalDpi xmlns:a14="http://schemas.microsoft.com/office/drawing/2010/main" val="0"/>
+                  <a14:useLocalDpi xmlns:a14="http://schemas.microsoft.com/office/drawing/2010/main" xmlns="" val="0"/>
                 </a:ext>
               </a:extLst>
             </a:blip>
@@ -8103,7 +8137,7 @@
             <a:noFill/>
             <a:extLst>
               <a:ext uri="{909E8E84-426E-40DD-AFC4-6F175D3DCCD1}">
-                <a14:hiddenFill xmlns:a14="http://schemas.microsoft.com/office/drawing/2010/main">
+                <a14:hiddenFill xmlns:a14="http://schemas.microsoft.com/office/drawing/2010/main" xmlns="">
                   <a:solidFill>
                     <a:srgbClr val="FFFFFF"/>
                   </a:solidFill>
@@ -8124,7 +8158,7 @@
             <a:blip r:embed="rId4" cstate="print">
               <a:extLst>
                 <a:ext uri="{28A0092B-C50C-407E-A947-70E740481C1C}">
-                  <a14:useLocalDpi xmlns:a14="http://schemas.microsoft.com/office/drawing/2010/main" val="0"/>
+                  <a14:useLocalDpi xmlns:a14="http://schemas.microsoft.com/office/drawing/2010/main" xmlns="" val="0"/>
                 </a:ext>
               </a:extLst>
             </a:blip>
@@ -8144,7 +8178,7 @@
             <a:noFill/>
             <a:extLst>
               <a:ext uri="{909E8E84-426E-40DD-AFC4-6F175D3DCCD1}">
-                <a14:hiddenFill xmlns:a14="http://schemas.microsoft.com/office/drawing/2010/main">
+                <a14:hiddenFill xmlns:a14="http://schemas.microsoft.com/office/drawing/2010/main" xmlns="">
                   <a:solidFill>
                     <a:srgbClr val="FFFFFF"/>
                   </a:solidFill>
@@ -8165,7 +8199,7 @@
             <a:blip r:embed="rId5" cstate="print">
               <a:extLst>
                 <a:ext uri="{28A0092B-C50C-407E-A947-70E740481C1C}">
-                  <a14:useLocalDpi xmlns:a14="http://schemas.microsoft.com/office/drawing/2010/main" val="0"/>
+                  <a14:useLocalDpi xmlns:a14="http://schemas.microsoft.com/office/drawing/2010/main" xmlns="" val="0"/>
                 </a:ext>
               </a:extLst>
             </a:blip>
@@ -8185,7 +8219,7 @@
             <a:noFill/>
             <a:extLst>
               <a:ext uri="{909E8E84-426E-40DD-AFC4-6F175D3DCCD1}">
-                <a14:hiddenFill xmlns:a14="http://schemas.microsoft.com/office/drawing/2010/main">
+                <a14:hiddenFill xmlns:a14="http://schemas.microsoft.com/office/drawing/2010/main" xmlns="">
                   <a:solidFill>
                     <a:srgbClr val="FFFFFF"/>
                   </a:solidFill>
@@ -8206,7 +8240,7 @@
             <a:blip r:embed="rId6" cstate="print">
               <a:extLst>
                 <a:ext uri="{28A0092B-C50C-407E-A947-70E740481C1C}">
-                  <a14:useLocalDpi xmlns:a14="http://schemas.microsoft.com/office/drawing/2010/main" val="0"/>
+                  <a14:useLocalDpi xmlns:a14="http://schemas.microsoft.com/office/drawing/2010/main" xmlns="" val="0"/>
                 </a:ext>
               </a:extLst>
             </a:blip>
@@ -8226,7 +8260,7 @@
             <a:noFill/>
             <a:extLst>
               <a:ext uri="{909E8E84-426E-40DD-AFC4-6F175D3DCCD1}">
-                <a14:hiddenFill xmlns:a14="http://schemas.microsoft.com/office/drawing/2010/main">
+                <a14:hiddenFill xmlns:a14="http://schemas.microsoft.com/office/drawing/2010/main" xmlns="">
                   <a:solidFill>
                     <a:srgbClr val="FFFFFF"/>
                   </a:solidFill>
@@ -8421,7 +8455,7 @@
             <a:blip r:embed="rId7" cstate="print">
               <a:extLst>
                 <a:ext uri="{28A0092B-C50C-407E-A947-70E740481C1C}">
-                  <a14:useLocalDpi xmlns:a14="http://schemas.microsoft.com/office/drawing/2010/main" val="0"/>
+                  <a14:useLocalDpi xmlns:a14="http://schemas.microsoft.com/office/drawing/2010/main" xmlns="" val="0"/>
                 </a:ext>
               </a:extLst>
             </a:blip>
@@ -8463,7 +8497,7 @@
             <a:blip r:embed="rId8" cstate="print">
               <a:extLst>
                 <a:ext uri="{28A0092B-C50C-407E-A947-70E740481C1C}">
-                  <a14:useLocalDpi xmlns:a14="http://schemas.microsoft.com/office/drawing/2010/main" val="0"/>
+                  <a14:useLocalDpi xmlns:a14="http://schemas.microsoft.com/office/drawing/2010/main" xmlns="" val="0"/>
                 </a:ext>
               </a:extLst>
             </a:blip>
@@ -8505,7 +8539,7 @@
             <a:blip r:embed="rId9" cstate="print">
               <a:extLst>
                 <a:ext uri="{28A0092B-C50C-407E-A947-70E740481C1C}">
-                  <a14:useLocalDpi xmlns:a14="http://schemas.microsoft.com/office/drawing/2010/main" val="0"/>
+                  <a14:useLocalDpi xmlns:a14="http://schemas.microsoft.com/office/drawing/2010/main" xmlns="" val="0"/>
                 </a:ext>
               </a:extLst>
             </a:blip>
@@ -8547,7 +8581,7 @@
             <a:blip r:embed="rId10" cstate="print">
               <a:extLst>
                 <a:ext uri="{28A0092B-C50C-407E-A947-70E740481C1C}">
-                  <a14:useLocalDpi xmlns:a14="http://schemas.microsoft.com/office/drawing/2010/main" val="0"/>
+                  <a14:useLocalDpi xmlns:a14="http://schemas.microsoft.com/office/drawing/2010/main" xmlns="" val="0"/>
                 </a:ext>
               </a:extLst>
             </a:blip>
@@ -8589,7 +8623,7 @@
             <a:blip r:embed="rId11" cstate="print">
               <a:extLst>
                 <a:ext uri="{28A0092B-C50C-407E-A947-70E740481C1C}">
-                  <a14:useLocalDpi xmlns:a14="http://schemas.microsoft.com/office/drawing/2010/main" val="0"/>
+                  <a14:useLocalDpi xmlns:a14="http://schemas.microsoft.com/office/drawing/2010/main" xmlns="" val="0"/>
                 </a:ext>
               </a:extLst>
             </a:blip>
@@ -8743,27 +8777,7 @@
                   </a:schemeClr>
                 </a:solidFill>
               </a:rPr>
-              <a:t>A- </a:t>
-            </a:r>
-            <a:r>
-              <a:rPr lang="nb-NO" sz="1200" b="1" dirty="0" err="1" smtClean="0">
-                <a:solidFill>
-                  <a:schemeClr val="tx2">
-                    <a:lumMod val="75000"/>
-                  </a:schemeClr>
-                </a:solidFill>
-              </a:rPr>
-              <a:t>Metabolic</a:t>
-            </a:r>
-            <a:r>
-              <a:rPr lang="nb-NO" sz="1200" b="1" dirty="0" smtClean="0">
-                <a:solidFill>
-                  <a:schemeClr val="tx2">
-                    <a:lumMod val="75000"/>
-                  </a:schemeClr>
-                </a:solidFill>
-              </a:rPr>
-              <a:t> </a:t>
+              <a:t>A- Metabolic </a:t>
             </a:r>
             <a:r>
               <a:rPr lang="nb-NO" sz="1200" b="1" dirty="0" err="1" smtClean="0">
@@ -10808,7 +10822,7 @@
             <a:blip r:embed="rId7" cstate="print">
               <a:extLst>
                 <a:ext uri="{28A0092B-C50C-407E-A947-70E740481C1C}">
-                  <a14:useLocalDpi xmlns:a14="http://schemas.microsoft.com/office/drawing/2010/main" val="0"/>
+                  <a14:useLocalDpi xmlns:a14="http://schemas.microsoft.com/office/drawing/2010/main" xmlns="" val="0"/>
                 </a:ext>
               </a:extLst>
             </a:blip>
@@ -10850,7 +10864,7 @@
             <a:blip r:embed="rId8" cstate="print">
               <a:extLst>
                 <a:ext uri="{28A0092B-C50C-407E-A947-70E740481C1C}">
-                  <a14:useLocalDpi xmlns:a14="http://schemas.microsoft.com/office/drawing/2010/main" val="0"/>
+                  <a14:useLocalDpi xmlns:a14="http://schemas.microsoft.com/office/drawing/2010/main" xmlns="" val="0"/>
                 </a:ext>
               </a:extLst>
             </a:blip>
@@ -10892,7 +10906,7 @@
             <a:blip r:embed="rId9" cstate="print">
               <a:extLst>
                 <a:ext uri="{28A0092B-C50C-407E-A947-70E740481C1C}">
-                  <a14:useLocalDpi xmlns:a14="http://schemas.microsoft.com/office/drawing/2010/main" val="0"/>
+                  <a14:useLocalDpi xmlns:a14="http://schemas.microsoft.com/office/drawing/2010/main" xmlns="" val="0"/>
                 </a:ext>
               </a:extLst>
             </a:blip>
@@ -10934,7 +10948,7 @@
             <a:blip r:embed="rId10" cstate="print">
               <a:extLst>
                 <a:ext uri="{28A0092B-C50C-407E-A947-70E740481C1C}">
-                  <a14:useLocalDpi xmlns:a14="http://schemas.microsoft.com/office/drawing/2010/main" val="0"/>
+                  <a14:useLocalDpi xmlns:a14="http://schemas.microsoft.com/office/drawing/2010/main" xmlns="" val="0"/>
                 </a:ext>
               </a:extLst>
             </a:blip>
@@ -10976,7 +10990,7 @@
             <a:blip r:embed="rId11" cstate="print">
               <a:extLst>
                 <a:ext uri="{28A0092B-C50C-407E-A947-70E740481C1C}">
-                  <a14:useLocalDpi xmlns:a14="http://schemas.microsoft.com/office/drawing/2010/main" val="0"/>
+                  <a14:useLocalDpi xmlns:a14="http://schemas.microsoft.com/office/drawing/2010/main" xmlns="" val="0"/>
                 </a:ext>
               </a:extLst>
             </a:blip>
@@ -11109,7 +11123,7 @@
               <a:blip r:embed="rId12" cstate="print">
                 <a:extLst>
                   <a:ext uri="{28A0092B-C50C-407E-A947-70E740481C1C}">
-                    <a14:useLocalDpi xmlns:a14="http://schemas.microsoft.com/office/drawing/2010/main" val="0"/>
+                    <a14:useLocalDpi xmlns:a14="http://schemas.microsoft.com/office/drawing/2010/main" xmlns="" val="0"/>
                   </a:ext>
                 </a:extLst>
               </a:blip>
@@ -11136,7 +11150,7 @@
               </a:effectLst>
               <a:extLst>
                 <a:ext uri="{909E8E84-426E-40DD-AFC4-6F175D3DCCD1}">
-                  <a14:hiddenFill xmlns:a14="http://schemas.microsoft.com/office/drawing/2010/main">
+                  <a14:hiddenFill xmlns:a14="http://schemas.microsoft.com/office/drawing/2010/main" xmlns="">
                     <a:solidFill>
                       <a:srgbClr val="FFFFFF"/>
                     </a:solidFill>
@@ -11205,7 +11219,7 @@
               <a:blip r:embed="rId12" cstate="print">
                 <a:extLst>
                   <a:ext uri="{28A0092B-C50C-407E-A947-70E740481C1C}">
-                    <a14:useLocalDpi xmlns:a14="http://schemas.microsoft.com/office/drawing/2010/main" val="0"/>
+                    <a14:useLocalDpi xmlns:a14="http://schemas.microsoft.com/office/drawing/2010/main" xmlns="" val="0"/>
                   </a:ext>
                 </a:extLst>
               </a:blip>
@@ -11232,7 +11246,7 @@
               </a:effectLst>
               <a:extLst>
                 <a:ext uri="{909E8E84-426E-40DD-AFC4-6F175D3DCCD1}">
-                  <a14:hiddenFill xmlns:a14="http://schemas.microsoft.com/office/drawing/2010/main">
+                  <a14:hiddenFill xmlns:a14="http://schemas.microsoft.com/office/drawing/2010/main" xmlns="">
                     <a:solidFill>
                       <a:srgbClr val="FFFFFF"/>
                     </a:solidFill>
@@ -11301,7 +11315,7 @@
               <a:blip r:embed="rId12" cstate="print">
                 <a:extLst>
                   <a:ext uri="{28A0092B-C50C-407E-A947-70E740481C1C}">
-                    <a14:useLocalDpi xmlns:a14="http://schemas.microsoft.com/office/drawing/2010/main" val="0"/>
+                    <a14:useLocalDpi xmlns:a14="http://schemas.microsoft.com/office/drawing/2010/main" xmlns="" val="0"/>
                   </a:ext>
                 </a:extLst>
               </a:blip>
@@ -11328,7 +11342,7 @@
               </a:effectLst>
               <a:extLst>
                 <a:ext uri="{909E8E84-426E-40DD-AFC4-6F175D3DCCD1}">
-                  <a14:hiddenFill xmlns:a14="http://schemas.microsoft.com/office/drawing/2010/main">
+                  <a14:hiddenFill xmlns:a14="http://schemas.microsoft.com/office/drawing/2010/main" xmlns="">
                     <a:solidFill>
                       <a:srgbClr val="FFFFFF"/>
                     </a:solidFill>
@@ -11397,7 +11411,7 @@
               <a:blip r:embed="rId12" cstate="print">
                 <a:extLst>
                   <a:ext uri="{28A0092B-C50C-407E-A947-70E740481C1C}">
-                    <a14:useLocalDpi xmlns:a14="http://schemas.microsoft.com/office/drawing/2010/main" val="0"/>
+                    <a14:useLocalDpi xmlns:a14="http://schemas.microsoft.com/office/drawing/2010/main" xmlns="" val="0"/>
                   </a:ext>
                 </a:extLst>
               </a:blip>
@@ -11424,7 +11438,7 @@
               </a:effectLst>
               <a:extLst>
                 <a:ext uri="{909E8E84-426E-40DD-AFC4-6F175D3DCCD1}">
-                  <a14:hiddenFill xmlns:a14="http://schemas.microsoft.com/office/drawing/2010/main">
+                  <a14:hiddenFill xmlns:a14="http://schemas.microsoft.com/office/drawing/2010/main" xmlns="">
                     <a:solidFill>
                       <a:srgbClr val="FFFFFF"/>
                     </a:solidFill>
@@ -11446,7 +11460,7 @@
             <a:blip r:embed="rId3" cstate="print">
               <a:extLst>
                 <a:ext uri="{28A0092B-C50C-407E-A947-70E740481C1C}">
-                  <a14:useLocalDpi xmlns:a14="http://schemas.microsoft.com/office/drawing/2010/main" val="0"/>
+                  <a14:useLocalDpi xmlns:a14="http://schemas.microsoft.com/office/drawing/2010/main" xmlns="" val="0"/>
                 </a:ext>
               </a:extLst>
             </a:blip>
@@ -11466,7 +11480,7 @@
             <a:noFill/>
             <a:extLst>
               <a:ext uri="{909E8E84-426E-40DD-AFC4-6F175D3DCCD1}">
-                <a14:hiddenFill xmlns:a14="http://schemas.microsoft.com/office/drawing/2010/main">
+                <a14:hiddenFill xmlns:a14="http://schemas.microsoft.com/office/drawing/2010/main" xmlns="">
                   <a:solidFill>
                     <a:srgbClr val="FFFFFF"/>
                   </a:solidFill>
@@ -11487,7 +11501,7 @@
             <a:blip r:embed="rId4" cstate="print">
               <a:extLst>
                 <a:ext uri="{28A0092B-C50C-407E-A947-70E740481C1C}">
-                  <a14:useLocalDpi xmlns:a14="http://schemas.microsoft.com/office/drawing/2010/main" val="0"/>
+                  <a14:useLocalDpi xmlns:a14="http://schemas.microsoft.com/office/drawing/2010/main" xmlns="" val="0"/>
                 </a:ext>
               </a:extLst>
             </a:blip>
@@ -11507,7 +11521,7 @@
             <a:noFill/>
             <a:extLst>
               <a:ext uri="{909E8E84-426E-40DD-AFC4-6F175D3DCCD1}">
-                <a14:hiddenFill xmlns:a14="http://schemas.microsoft.com/office/drawing/2010/main">
+                <a14:hiddenFill xmlns:a14="http://schemas.microsoft.com/office/drawing/2010/main" xmlns="">
                   <a:solidFill>
                     <a:srgbClr val="FFFFFF"/>
                   </a:solidFill>
@@ -11528,7 +11542,7 @@
             <a:blip r:embed="rId5" cstate="print">
               <a:extLst>
                 <a:ext uri="{28A0092B-C50C-407E-A947-70E740481C1C}">
-                  <a14:useLocalDpi xmlns:a14="http://schemas.microsoft.com/office/drawing/2010/main" val="0"/>
+                  <a14:useLocalDpi xmlns:a14="http://schemas.microsoft.com/office/drawing/2010/main" xmlns="" val="0"/>
                 </a:ext>
               </a:extLst>
             </a:blip>
@@ -11548,7 +11562,7 @@
             <a:noFill/>
             <a:extLst>
               <a:ext uri="{909E8E84-426E-40DD-AFC4-6F175D3DCCD1}">
-                <a14:hiddenFill xmlns:a14="http://schemas.microsoft.com/office/drawing/2010/main">
+                <a14:hiddenFill xmlns:a14="http://schemas.microsoft.com/office/drawing/2010/main" xmlns="">
                   <a:solidFill>
                     <a:srgbClr val="FFFFFF"/>
                   </a:solidFill>
@@ -11569,7 +11583,7 @@
             <a:blip r:embed="rId6" cstate="print">
               <a:extLst>
                 <a:ext uri="{28A0092B-C50C-407E-A947-70E740481C1C}">
-                  <a14:useLocalDpi xmlns:a14="http://schemas.microsoft.com/office/drawing/2010/main" val="0"/>
+                  <a14:useLocalDpi xmlns:a14="http://schemas.microsoft.com/office/drawing/2010/main" xmlns="" val="0"/>
                 </a:ext>
               </a:extLst>
             </a:blip>
@@ -11589,7 +11603,7 @@
             <a:noFill/>
             <a:extLst>
               <a:ext uri="{909E8E84-426E-40DD-AFC4-6F175D3DCCD1}">
-                <a14:hiddenFill xmlns:a14="http://schemas.microsoft.com/office/drawing/2010/main">
+                <a14:hiddenFill xmlns:a14="http://schemas.microsoft.com/office/drawing/2010/main" xmlns="">
                   <a:solidFill>
                     <a:srgbClr val="FFFFFF"/>
                   </a:solidFill>
@@ -11641,7 +11655,7 @@
               <a:blip r:embed="rId13" cstate="print">
                 <a:extLst>
                   <a:ext uri="{28A0092B-C50C-407E-A947-70E740481C1C}">
-                    <a14:useLocalDpi xmlns:a14="http://schemas.microsoft.com/office/drawing/2010/main" val="0"/>
+                    <a14:useLocalDpi xmlns:a14="http://schemas.microsoft.com/office/drawing/2010/main" xmlns="" val="0"/>
                   </a:ext>
                 </a:extLst>
               </a:blip>
@@ -11668,7 +11682,7 @@
               </a:effectLst>
               <a:extLst>
                 <a:ext uri="{909E8E84-426E-40DD-AFC4-6F175D3DCCD1}">
-                  <a14:hiddenFill xmlns:a14="http://schemas.microsoft.com/office/drawing/2010/main">
+                  <a14:hiddenFill xmlns:a14="http://schemas.microsoft.com/office/drawing/2010/main" xmlns="">
                     <a:solidFill>
                       <a:srgbClr val="FFFFFF"/>
                     </a:solidFill>
@@ -11737,7 +11751,7 @@
               <a:blip r:embed="rId13" cstate="print">
                 <a:extLst>
                   <a:ext uri="{28A0092B-C50C-407E-A947-70E740481C1C}">
-                    <a14:useLocalDpi xmlns:a14="http://schemas.microsoft.com/office/drawing/2010/main" val="0"/>
+                    <a14:useLocalDpi xmlns:a14="http://schemas.microsoft.com/office/drawing/2010/main" xmlns="" val="0"/>
                   </a:ext>
                 </a:extLst>
               </a:blip>
@@ -11764,7 +11778,7 @@
               </a:effectLst>
               <a:extLst>
                 <a:ext uri="{909E8E84-426E-40DD-AFC4-6F175D3DCCD1}">
-                  <a14:hiddenFill xmlns:a14="http://schemas.microsoft.com/office/drawing/2010/main">
+                  <a14:hiddenFill xmlns:a14="http://schemas.microsoft.com/office/drawing/2010/main" xmlns="">
                     <a:solidFill>
                       <a:srgbClr val="FFFFFF"/>
                     </a:solidFill>
@@ -11833,7 +11847,7 @@
               <a:blip r:embed="rId13" cstate="print">
                 <a:extLst>
                   <a:ext uri="{28A0092B-C50C-407E-A947-70E740481C1C}">
-                    <a14:useLocalDpi xmlns:a14="http://schemas.microsoft.com/office/drawing/2010/main" val="0"/>
+                    <a14:useLocalDpi xmlns:a14="http://schemas.microsoft.com/office/drawing/2010/main" xmlns="" val="0"/>
                   </a:ext>
                 </a:extLst>
               </a:blip>
@@ -11860,7 +11874,7 @@
               </a:effectLst>
               <a:extLst>
                 <a:ext uri="{909E8E84-426E-40DD-AFC4-6F175D3DCCD1}">
-                  <a14:hiddenFill xmlns:a14="http://schemas.microsoft.com/office/drawing/2010/main">
+                  <a14:hiddenFill xmlns:a14="http://schemas.microsoft.com/office/drawing/2010/main" xmlns="">
                     <a:solidFill>
                       <a:srgbClr val="FFFFFF"/>
                     </a:solidFill>
@@ -11929,7 +11943,7 @@
               <a:blip r:embed="rId13" cstate="print">
                 <a:extLst>
                   <a:ext uri="{28A0092B-C50C-407E-A947-70E740481C1C}">
-                    <a14:useLocalDpi xmlns:a14="http://schemas.microsoft.com/office/drawing/2010/main" val="0"/>
+                    <a14:useLocalDpi xmlns:a14="http://schemas.microsoft.com/office/drawing/2010/main" xmlns="" val="0"/>
                   </a:ext>
                 </a:extLst>
               </a:blip>
@@ -11956,7 +11970,7 @@
               </a:effectLst>
               <a:extLst>
                 <a:ext uri="{909E8E84-426E-40DD-AFC4-6F175D3DCCD1}">
-                  <a14:hiddenFill xmlns:a14="http://schemas.microsoft.com/office/drawing/2010/main">
+                  <a14:hiddenFill xmlns:a14="http://schemas.microsoft.com/office/drawing/2010/main" xmlns="">
                     <a:solidFill>
                       <a:srgbClr val="FFFFFF"/>
                     </a:solidFill>
@@ -11978,7 +11992,7 @@
             <a:blip r:embed="rId14" cstate="print">
               <a:extLst>
                 <a:ext uri="{28A0092B-C50C-407E-A947-70E740481C1C}">
-                  <a14:useLocalDpi xmlns:a14="http://schemas.microsoft.com/office/drawing/2010/main" val="0"/>
+                  <a14:useLocalDpi xmlns:a14="http://schemas.microsoft.com/office/drawing/2010/main" xmlns="" val="0"/>
                 </a:ext>
               </a:extLst>
             </a:blip>
@@ -11998,7 +12012,7 @@
             <a:noFill/>
             <a:extLst>
               <a:ext uri="{909E8E84-426E-40DD-AFC4-6F175D3DCCD1}">
-                <a14:hiddenFill xmlns:a14="http://schemas.microsoft.com/office/drawing/2010/main">
+                <a14:hiddenFill xmlns:a14="http://schemas.microsoft.com/office/drawing/2010/main" xmlns="">
                   <a:solidFill>
                     <a:srgbClr val="FFFFFF"/>
                   </a:solidFill>
@@ -12019,7 +12033,7 @@
             <a:blip r:embed="rId15" cstate="print">
               <a:extLst>
                 <a:ext uri="{28A0092B-C50C-407E-A947-70E740481C1C}">
-                  <a14:useLocalDpi xmlns:a14="http://schemas.microsoft.com/office/drawing/2010/main" val="0"/>
+                  <a14:useLocalDpi xmlns:a14="http://schemas.microsoft.com/office/drawing/2010/main" xmlns="" val="0"/>
                 </a:ext>
               </a:extLst>
             </a:blip>
@@ -12039,7 +12053,7 @@
             <a:noFill/>
             <a:extLst>
               <a:ext uri="{909E8E84-426E-40DD-AFC4-6F175D3DCCD1}">
-                <a14:hiddenFill xmlns:a14="http://schemas.microsoft.com/office/drawing/2010/main">
+                <a14:hiddenFill xmlns:a14="http://schemas.microsoft.com/office/drawing/2010/main" xmlns="">
                   <a:solidFill>
                     <a:srgbClr val="FFFFFF"/>
                   </a:solidFill>
@@ -12060,7 +12074,7 @@
             <a:blip r:embed="rId16" cstate="print">
               <a:extLst>
                 <a:ext uri="{28A0092B-C50C-407E-A947-70E740481C1C}">
-                  <a14:useLocalDpi xmlns:a14="http://schemas.microsoft.com/office/drawing/2010/main" val="0"/>
+                  <a14:useLocalDpi xmlns:a14="http://schemas.microsoft.com/office/drawing/2010/main" xmlns="" val="0"/>
                 </a:ext>
               </a:extLst>
             </a:blip>
@@ -12080,7 +12094,7 @@
             <a:noFill/>
             <a:extLst>
               <a:ext uri="{909E8E84-426E-40DD-AFC4-6F175D3DCCD1}">
-                <a14:hiddenFill xmlns:a14="http://schemas.microsoft.com/office/drawing/2010/main">
+                <a14:hiddenFill xmlns:a14="http://schemas.microsoft.com/office/drawing/2010/main" xmlns="">
                   <a:solidFill>
                     <a:srgbClr val="FFFFFF"/>
                   </a:solidFill>
@@ -12101,7 +12115,7 @@
             <a:blip r:embed="rId17" cstate="print">
               <a:extLst>
                 <a:ext uri="{28A0092B-C50C-407E-A947-70E740481C1C}">
-                  <a14:useLocalDpi xmlns:a14="http://schemas.microsoft.com/office/drawing/2010/main" val="0"/>
+                  <a14:useLocalDpi xmlns:a14="http://schemas.microsoft.com/office/drawing/2010/main" xmlns="" val="0"/>
                 </a:ext>
               </a:extLst>
             </a:blip>
@@ -12121,7 +12135,7 @@
             <a:noFill/>
             <a:extLst>
               <a:ext uri="{909E8E84-426E-40DD-AFC4-6F175D3DCCD1}">
-                <a14:hiddenFill xmlns:a14="http://schemas.microsoft.com/office/drawing/2010/main">
+                <a14:hiddenFill xmlns:a14="http://schemas.microsoft.com/office/drawing/2010/main" xmlns="">
                   <a:solidFill>
                     <a:srgbClr val="FFFFFF"/>
                   </a:solidFill>
@@ -12139,8 +12153,8 @@
         </p:nvSpPr>
         <p:spPr>
           <a:xfrm>
-            <a:off x="4941168" y="56443"/>
-            <a:ext cx="1517468" cy="276999"/>
+            <a:off x="5208486" y="56443"/>
+            <a:ext cx="982833" cy="276999"/>
           </a:xfrm>
           <a:prstGeom prst="rect">
             <a:avLst/>
@@ -12162,7 +12176,7 @@
                   </a:schemeClr>
                 </a:solidFill>
               </a:rPr>
-              <a:t>B- Chemical </a:t>
+              <a:t>B- </a:t>
             </a:r>
             <a:r>
               <a:rPr lang="nb-NO" sz="1200" b="1" dirty="0" err="1" smtClean="0">
@@ -12172,7 +12186,27 @@
                   </a:schemeClr>
                 </a:solidFill>
               </a:rPr>
-              <a:t>labelling</a:t>
+              <a:t>Label</a:t>
+            </a:r>
+            <a:r>
+              <a:rPr lang="nb-NO" sz="1200" b="1" dirty="0" smtClean="0">
+                <a:solidFill>
+                  <a:schemeClr val="tx2">
+                    <a:lumMod val="75000"/>
+                  </a:schemeClr>
+                </a:solidFill>
+              </a:rPr>
+              <a:t> </a:t>
+            </a:r>
+            <a:r>
+              <a:rPr lang="nb-NO" sz="1200" b="1" dirty="0" err="1" smtClean="0">
+                <a:solidFill>
+                  <a:schemeClr val="tx2">
+                    <a:lumMod val="75000"/>
+                  </a:schemeClr>
+                </a:solidFill>
+              </a:rPr>
+              <a:t>free</a:t>
             </a:r>
             <a:endParaRPr lang="nb-NO" sz="1200" b="1" dirty="0">
               <a:solidFill>
@@ -12193,7 +12227,7 @@
         <p:spPr>
           <a:xfrm>
             <a:off x="3976097" y="1777836"/>
-            <a:ext cx="244827" cy="146448"/>
+            <a:ext cx="316999" cy="150828"/>
           </a:xfrm>
           <a:prstGeom prst="hexagon">
             <a:avLst/>
@@ -12236,7 +12270,17 @@
                   </a:schemeClr>
                 </a:solidFill>
               </a:rPr>
-              <a:t>+6 Da</a:t>
+              <a:t>+X </a:t>
+            </a:r>
+            <a:r>
+              <a:rPr lang="nb-NO" sz="600" b="1" dirty="0" smtClean="0">
+                <a:solidFill>
+                  <a:schemeClr val="accent4">
+                    <a:lumMod val="50000"/>
+                  </a:schemeClr>
+                </a:solidFill>
+              </a:rPr>
+              <a:t>Da</a:t>
             </a:r>
             <a:endParaRPr lang="nb-NO" sz="600" b="1" dirty="0">
               <a:solidFill>
@@ -12258,8 +12302,8 @@
         </p:nvCxnSpPr>
         <p:spPr>
           <a:xfrm flipH="1">
-            <a:off x="3878358" y="1851060"/>
-            <a:ext cx="97739" cy="39001"/>
+            <a:off x="3878359" y="1853250"/>
+            <a:ext cx="97738" cy="36811"/>
           </a:xfrm>
           <a:prstGeom prst="line">
             <a:avLst/>
@@ -12327,7 +12371,7 @@
               <a:blip r:embed="rId2" cstate="print">
                 <a:extLst>
                   <a:ext uri="{28A0092B-C50C-407E-A947-70E740481C1C}">
-                    <a14:useLocalDpi xmlns:a14="http://schemas.microsoft.com/office/drawing/2010/main" val="0"/>
+                    <a14:useLocalDpi xmlns:a14="http://schemas.microsoft.com/office/drawing/2010/main" xmlns="" val="0"/>
                   </a:ext>
                 </a:extLst>
               </a:blip>
@@ -12347,7 +12391,7 @@
               <a:noFill/>
               <a:extLst>
                 <a:ext uri="{909E8E84-426E-40DD-AFC4-6F175D3DCCD1}">
-                  <a14:hiddenFill xmlns:a14="http://schemas.microsoft.com/office/drawing/2010/main">
+                  <a14:hiddenFill xmlns:a14="http://schemas.microsoft.com/office/drawing/2010/main" xmlns="">
                     <a:solidFill>
                       <a:srgbClr val="FFFFFF"/>
                     </a:solidFill>
@@ -12416,7 +12460,7 @@
               <a:blip r:embed="rId2" cstate="print">
                 <a:extLst>
                   <a:ext uri="{28A0092B-C50C-407E-A947-70E740481C1C}">
-                    <a14:useLocalDpi xmlns:a14="http://schemas.microsoft.com/office/drawing/2010/main" val="0"/>
+                    <a14:useLocalDpi xmlns:a14="http://schemas.microsoft.com/office/drawing/2010/main" xmlns="" val="0"/>
                   </a:ext>
                 </a:extLst>
               </a:blip>
@@ -12436,7 +12480,7 @@
               <a:noFill/>
               <a:extLst>
                 <a:ext uri="{909E8E84-426E-40DD-AFC4-6F175D3DCCD1}">
-                  <a14:hiddenFill xmlns:a14="http://schemas.microsoft.com/office/drawing/2010/main">
+                  <a14:hiddenFill xmlns:a14="http://schemas.microsoft.com/office/drawing/2010/main" xmlns="">
                     <a:solidFill>
                       <a:srgbClr val="FFFFFF"/>
                     </a:solidFill>
@@ -12505,7 +12549,7 @@
               <a:blip r:embed="rId2" cstate="print">
                 <a:extLst>
                   <a:ext uri="{28A0092B-C50C-407E-A947-70E740481C1C}">
-                    <a14:useLocalDpi xmlns:a14="http://schemas.microsoft.com/office/drawing/2010/main" val="0"/>
+                    <a14:useLocalDpi xmlns:a14="http://schemas.microsoft.com/office/drawing/2010/main" xmlns="" val="0"/>
                   </a:ext>
                 </a:extLst>
               </a:blip>
@@ -12525,7 +12569,7 @@
               <a:noFill/>
               <a:extLst>
                 <a:ext uri="{909E8E84-426E-40DD-AFC4-6F175D3DCCD1}">
-                  <a14:hiddenFill xmlns:a14="http://schemas.microsoft.com/office/drawing/2010/main">
+                  <a14:hiddenFill xmlns:a14="http://schemas.microsoft.com/office/drawing/2010/main" xmlns="">
                     <a:solidFill>
                       <a:srgbClr val="FFFFFF"/>
                     </a:solidFill>
@@ -12594,7 +12638,7 @@
               <a:blip r:embed="rId2" cstate="print">
                 <a:extLst>
                   <a:ext uri="{28A0092B-C50C-407E-A947-70E740481C1C}">
-                    <a14:useLocalDpi xmlns:a14="http://schemas.microsoft.com/office/drawing/2010/main" val="0"/>
+                    <a14:useLocalDpi xmlns:a14="http://schemas.microsoft.com/office/drawing/2010/main" xmlns="" val="0"/>
                   </a:ext>
                 </a:extLst>
               </a:blip>
@@ -12614,7 +12658,7 @@
               <a:noFill/>
               <a:extLst>
                 <a:ext uri="{909E8E84-426E-40DD-AFC4-6F175D3DCCD1}">
-                  <a14:hiddenFill xmlns:a14="http://schemas.microsoft.com/office/drawing/2010/main">
+                  <a14:hiddenFill xmlns:a14="http://schemas.microsoft.com/office/drawing/2010/main" xmlns="">
                     <a:solidFill>
                       <a:srgbClr val="FFFFFF"/>
                     </a:solidFill>
@@ -12636,7 +12680,7 @@
             <a:blip r:embed="rId3" cstate="print">
               <a:extLst>
                 <a:ext uri="{28A0092B-C50C-407E-A947-70E740481C1C}">
-                  <a14:useLocalDpi xmlns:a14="http://schemas.microsoft.com/office/drawing/2010/main" val="0"/>
+                  <a14:useLocalDpi xmlns:a14="http://schemas.microsoft.com/office/drawing/2010/main" xmlns="" val="0"/>
                 </a:ext>
               </a:extLst>
             </a:blip>
@@ -12656,7 +12700,7 @@
             <a:noFill/>
             <a:extLst>
               <a:ext uri="{909E8E84-426E-40DD-AFC4-6F175D3DCCD1}">
-                <a14:hiddenFill xmlns:a14="http://schemas.microsoft.com/office/drawing/2010/main">
+                <a14:hiddenFill xmlns:a14="http://schemas.microsoft.com/office/drawing/2010/main" xmlns="">
                   <a:solidFill>
                     <a:srgbClr val="FFFFFF"/>
                   </a:solidFill>
@@ -12677,7 +12721,7 @@
             <a:blip r:embed="rId4" cstate="print">
               <a:extLst>
                 <a:ext uri="{28A0092B-C50C-407E-A947-70E740481C1C}">
-                  <a14:useLocalDpi xmlns:a14="http://schemas.microsoft.com/office/drawing/2010/main" val="0"/>
+                  <a14:useLocalDpi xmlns:a14="http://schemas.microsoft.com/office/drawing/2010/main" xmlns="" val="0"/>
                 </a:ext>
               </a:extLst>
             </a:blip>
@@ -12697,7 +12741,7 @@
             <a:noFill/>
             <a:extLst>
               <a:ext uri="{909E8E84-426E-40DD-AFC4-6F175D3DCCD1}">
-                <a14:hiddenFill xmlns:a14="http://schemas.microsoft.com/office/drawing/2010/main">
+                <a14:hiddenFill xmlns:a14="http://schemas.microsoft.com/office/drawing/2010/main" xmlns="">
                   <a:solidFill>
                     <a:srgbClr val="FFFFFF"/>
                   </a:solidFill>
@@ -12718,7 +12762,7 @@
             <a:blip r:embed="rId5" cstate="print">
               <a:extLst>
                 <a:ext uri="{28A0092B-C50C-407E-A947-70E740481C1C}">
-                  <a14:useLocalDpi xmlns:a14="http://schemas.microsoft.com/office/drawing/2010/main" val="0"/>
+                  <a14:useLocalDpi xmlns:a14="http://schemas.microsoft.com/office/drawing/2010/main" xmlns="" val="0"/>
                 </a:ext>
               </a:extLst>
             </a:blip>
@@ -12738,7 +12782,7 @@
             <a:noFill/>
             <a:extLst>
               <a:ext uri="{909E8E84-426E-40DD-AFC4-6F175D3DCCD1}">
-                <a14:hiddenFill xmlns:a14="http://schemas.microsoft.com/office/drawing/2010/main">
+                <a14:hiddenFill xmlns:a14="http://schemas.microsoft.com/office/drawing/2010/main" xmlns="">
                   <a:solidFill>
                     <a:srgbClr val="FFFFFF"/>
                   </a:solidFill>
@@ -12759,7 +12803,7 @@
             <a:blip r:embed="rId6" cstate="print">
               <a:extLst>
                 <a:ext uri="{28A0092B-C50C-407E-A947-70E740481C1C}">
-                  <a14:useLocalDpi xmlns:a14="http://schemas.microsoft.com/office/drawing/2010/main" val="0"/>
+                  <a14:useLocalDpi xmlns:a14="http://schemas.microsoft.com/office/drawing/2010/main" xmlns="" val="0"/>
                 </a:ext>
               </a:extLst>
             </a:blip>
@@ -12779,7 +12823,7 @@
             <a:noFill/>
             <a:extLst>
               <a:ext uri="{909E8E84-426E-40DD-AFC4-6F175D3DCCD1}">
-                <a14:hiddenFill xmlns:a14="http://schemas.microsoft.com/office/drawing/2010/main">
+                <a14:hiddenFill xmlns:a14="http://schemas.microsoft.com/office/drawing/2010/main" xmlns="">
                   <a:solidFill>
                     <a:srgbClr val="FFFFFF"/>
                   </a:solidFill>
@@ -14690,7 +14734,7 @@
             <a:blip r:embed="rId7" cstate="print">
               <a:extLst>
                 <a:ext uri="{28A0092B-C50C-407E-A947-70E740481C1C}">
-                  <a14:useLocalDpi xmlns:a14="http://schemas.microsoft.com/office/drawing/2010/main" val="0"/>
+                  <a14:useLocalDpi xmlns:a14="http://schemas.microsoft.com/office/drawing/2010/main" xmlns="" val="0"/>
                 </a:ext>
               </a:extLst>
             </a:blip>
@@ -14732,7 +14776,7 @@
             <a:blip r:embed="rId8" cstate="print">
               <a:extLst>
                 <a:ext uri="{28A0092B-C50C-407E-A947-70E740481C1C}">
-                  <a14:useLocalDpi xmlns:a14="http://schemas.microsoft.com/office/drawing/2010/main" val="0"/>
+                  <a14:useLocalDpi xmlns:a14="http://schemas.microsoft.com/office/drawing/2010/main" xmlns="" val="0"/>
                 </a:ext>
               </a:extLst>
             </a:blip>
@@ -14774,7 +14818,7 @@
             <a:blip r:embed="rId9" cstate="print">
               <a:extLst>
                 <a:ext uri="{28A0092B-C50C-407E-A947-70E740481C1C}">
-                  <a14:useLocalDpi xmlns:a14="http://schemas.microsoft.com/office/drawing/2010/main" val="0"/>
+                  <a14:useLocalDpi xmlns:a14="http://schemas.microsoft.com/office/drawing/2010/main" xmlns="" val="0"/>
                 </a:ext>
               </a:extLst>
             </a:blip>
@@ -14816,7 +14860,7 @@
             <a:blip r:embed="rId10" cstate="print">
               <a:extLst>
                 <a:ext uri="{28A0092B-C50C-407E-A947-70E740481C1C}">
-                  <a14:useLocalDpi xmlns:a14="http://schemas.microsoft.com/office/drawing/2010/main" val="0"/>
+                  <a14:useLocalDpi xmlns:a14="http://schemas.microsoft.com/office/drawing/2010/main" xmlns="" val="0"/>
                 </a:ext>
               </a:extLst>
             </a:blip>
@@ -14858,7 +14902,7 @@
             <a:blip r:embed="rId11" cstate="print">
               <a:extLst>
                 <a:ext uri="{28A0092B-C50C-407E-A947-70E740481C1C}">
-                  <a14:useLocalDpi xmlns:a14="http://schemas.microsoft.com/office/drawing/2010/main" val="0"/>
+                  <a14:useLocalDpi xmlns:a14="http://schemas.microsoft.com/office/drawing/2010/main" xmlns="" val="0"/>
                 </a:ext>
               </a:extLst>
             </a:blip>
@@ -14991,7 +15035,7 @@
               <a:blip r:embed="rId12" cstate="print">
                 <a:extLst>
                   <a:ext uri="{28A0092B-C50C-407E-A947-70E740481C1C}">
-                    <a14:useLocalDpi xmlns:a14="http://schemas.microsoft.com/office/drawing/2010/main" val="0"/>
+                    <a14:useLocalDpi xmlns:a14="http://schemas.microsoft.com/office/drawing/2010/main" xmlns="" val="0"/>
                   </a:ext>
                 </a:extLst>
               </a:blip>
@@ -15018,7 +15062,7 @@
               </a:effectLst>
               <a:extLst>
                 <a:ext uri="{909E8E84-426E-40DD-AFC4-6F175D3DCCD1}">
-                  <a14:hiddenFill xmlns:a14="http://schemas.microsoft.com/office/drawing/2010/main">
+                  <a14:hiddenFill xmlns:a14="http://schemas.microsoft.com/office/drawing/2010/main" xmlns="">
                     <a:solidFill>
                       <a:srgbClr val="FFFFFF"/>
                     </a:solidFill>
@@ -15087,7 +15131,7 @@
               <a:blip r:embed="rId12" cstate="print">
                 <a:extLst>
                   <a:ext uri="{28A0092B-C50C-407E-A947-70E740481C1C}">
-                    <a14:useLocalDpi xmlns:a14="http://schemas.microsoft.com/office/drawing/2010/main" val="0"/>
+                    <a14:useLocalDpi xmlns:a14="http://schemas.microsoft.com/office/drawing/2010/main" xmlns="" val="0"/>
                   </a:ext>
                 </a:extLst>
               </a:blip>
@@ -15114,7 +15158,7 @@
               </a:effectLst>
               <a:extLst>
                 <a:ext uri="{909E8E84-426E-40DD-AFC4-6F175D3DCCD1}">
-                  <a14:hiddenFill xmlns:a14="http://schemas.microsoft.com/office/drawing/2010/main">
+                  <a14:hiddenFill xmlns:a14="http://schemas.microsoft.com/office/drawing/2010/main" xmlns="">
                     <a:solidFill>
                       <a:srgbClr val="FFFFFF"/>
                     </a:solidFill>
@@ -15183,7 +15227,7 @@
               <a:blip r:embed="rId12" cstate="print">
                 <a:extLst>
                   <a:ext uri="{28A0092B-C50C-407E-A947-70E740481C1C}">
-                    <a14:useLocalDpi xmlns:a14="http://schemas.microsoft.com/office/drawing/2010/main" val="0"/>
+                    <a14:useLocalDpi xmlns:a14="http://schemas.microsoft.com/office/drawing/2010/main" xmlns="" val="0"/>
                   </a:ext>
                 </a:extLst>
               </a:blip>
@@ -15210,7 +15254,7 @@
               </a:effectLst>
               <a:extLst>
                 <a:ext uri="{909E8E84-426E-40DD-AFC4-6F175D3DCCD1}">
-                  <a14:hiddenFill xmlns:a14="http://schemas.microsoft.com/office/drawing/2010/main">
+                  <a14:hiddenFill xmlns:a14="http://schemas.microsoft.com/office/drawing/2010/main" xmlns="">
                     <a:solidFill>
                       <a:srgbClr val="FFFFFF"/>
                     </a:solidFill>
@@ -15279,7 +15323,7 @@
               <a:blip r:embed="rId12" cstate="print">
                 <a:extLst>
                   <a:ext uri="{28A0092B-C50C-407E-A947-70E740481C1C}">
-                    <a14:useLocalDpi xmlns:a14="http://schemas.microsoft.com/office/drawing/2010/main" val="0"/>
+                    <a14:useLocalDpi xmlns:a14="http://schemas.microsoft.com/office/drawing/2010/main" xmlns="" val="0"/>
                   </a:ext>
                 </a:extLst>
               </a:blip>
@@ -15306,7 +15350,7 @@
               </a:effectLst>
               <a:extLst>
                 <a:ext uri="{909E8E84-426E-40DD-AFC4-6F175D3DCCD1}">
-                  <a14:hiddenFill xmlns:a14="http://schemas.microsoft.com/office/drawing/2010/main">
+                  <a14:hiddenFill xmlns:a14="http://schemas.microsoft.com/office/drawing/2010/main" xmlns="">
                     <a:solidFill>
                       <a:srgbClr val="FFFFFF"/>
                     </a:solidFill>
@@ -15328,7 +15372,7 @@
             <a:blip r:embed="rId3" cstate="print">
               <a:extLst>
                 <a:ext uri="{28A0092B-C50C-407E-A947-70E740481C1C}">
-                  <a14:useLocalDpi xmlns:a14="http://schemas.microsoft.com/office/drawing/2010/main" val="0"/>
+                  <a14:useLocalDpi xmlns:a14="http://schemas.microsoft.com/office/drawing/2010/main" xmlns="" val="0"/>
                 </a:ext>
               </a:extLst>
             </a:blip>
@@ -15348,7 +15392,7 @@
             <a:noFill/>
             <a:extLst>
               <a:ext uri="{909E8E84-426E-40DD-AFC4-6F175D3DCCD1}">
-                <a14:hiddenFill xmlns:a14="http://schemas.microsoft.com/office/drawing/2010/main">
+                <a14:hiddenFill xmlns:a14="http://schemas.microsoft.com/office/drawing/2010/main" xmlns="">
                   <a:solidFill>
                     <a:srgbClr val="FFFFFF"/>
                   </a:solidFill>
@@ -15369,7 +15413,7 @@
             <a:blip r:embed="rId4" cstate="print">
               <a:extLst>
                 <a:ext uri="{28A0092B-C50C-407E-A947-70E740481C1C}">
-                  <a14:useLocalDpi xmlns:a14="http://schemas.microsoft.com/office/drawing/2010/main" val="0"/>
+                  <a14:useLocalDpi xmlns:a14="http://schemas.microsoft.com/office/drawing/2010/main" xmlns="" val="0"/>
                 </a:ext>
               </a:extLst>
             </a:blip>
@@ -15389,7 +15433,7 @@
             <a:noFill/>
             <a:extLst>
               <a:ext uri="{909E8E84-426E-40DD-AFC4-6F175D3DCCD1}">
-                <a14:hiddenFill xmlns:a14="http://schemas.microsoft.com/office/drawing/2010/main">
+                <a14:hiddenFill xmlns:a14="http://schemas.microsoft.com/office/drawing/2010/main" xmlns="">
                   <a:solidFill>
                     <a:srgbClr val="FFFFFF"/>
                   </a:solidFill>
@@ -15410,7 +15454,7 @@
             <a:blip r:embed="rId5" cstate="print">
               <a:extLst>
                 <a:ext uri="{28A0092B-C50C-407E-A947-70E740481C1C}">
-                  <a14:useLocalDpi xmlns:a14="http://schemas.microsoft.com/office/drawing/2010/main" val="0"/>
+                  <a14:useLocalDpi xmlns:a14="http://schemas.microsoft.com/office/drawing/2010/main" xmlns="" val="0"/>
                 </a:ext>
               </a:extLst>
             </a:blip>
@@ -15430,7 +15474,7 @@
             <a:noFill/>
             <a:extLst>
               <a:ext uri="{909E8E84-426E-40DD-AFC4-6F175D3DCCD1}">
-                <a14:hiddenFill xmlns:a14="http://schemas.microsoft.com/office/drawing/2010/main">
+                <a14:hiddenFill xmlns:a14="http://schemas.microsoft.com/office/drawing/2010/main" xmlns="">
                   <a:solidFill>
                     <a:srgbClr val="FFFFFF"/>
                   </a:solidFill>
@@ -15451,7 +15495,7 @@
             <a:blip r:embed="rId6" cstate="print">
               <a:extLst>
                 <a:ext uri="{28A0092B-C50C-407E-A947-70E740481C1C}">
-                  <a14:useLocalDpi xmlns:a14="http://schemas.microsoft.com/office/drawing/2010/main" val="0"/>
+                  <a14:useLocalDpi xmlns:a14="http://schemas.microsoft.com/office/drawing/2010/main" xmlns="" val="0"/>
                 </a:ext>
               </a:extLst>
             </a:blip>
@@ -15471,7 +15515,7 @@
             <a:noFill/>
             <a:extLst>
               <a:ext uri="{909E8E84-426E-40DD-AFC4-6F175D3DCCD1}">
-                <a14:hiddenFill xmlns:a14="http://schemas.microsoft.com/office/drawing/2010/main">
+                <a14:hiddenFill xmlns:a14="http://schemas.microsoft.com/office/drawing/2010/main" xmlns="">
                   <a:solidFill>
                     <a:srgbClr val="FFFFFF"/>
                   </a:solidFill>
@@ -15523,7 +15567,7 @@
               <a:blip r:embed="rId13" cstate="print">
                 <a:extLst>
                   <a:ext uri="{28A0092B-C50C-407E-A947-70E740481C1C}">
-                    <a14:useLocalDpi xmlns:a14="http://schemas.microsoft.com/office/drawing/2010/main" val="0"/>
+                    <a14:useLocalDpi xmlns:a14="http://schemas.microsoft.com/office/drawing/2010/main" xmlns="" val="0"/>
                   </a:ext>
                 </a:extLst>
               </a:blip>
@@ -15550,7 +15594,7 @@
               </a:effectLst>
               <a:extLst>
                 <a:ext uri="{909E8E84-426E-40DD-AFC4-6F175D3DCCD1}">
-                  <a14:hiddenFill xmlns:a14="http://schemas.microsoft.com/office/drawing/2010/main">
+                  <a14:hiddenFill xmlns:a14="http://schemas.microsoft.com/office/drawing/2010/main" xmlns="">
                     <a:solidFill>
                       <a:srgbClr val="FFFFFF"/>
                     </a:solidFill>
@@ -15619,7 +15663,7 @@
               <a:blip r:embed="rId13" cstate="print">
                 <a:extLst>
                   <a:ext uri="{28A0092B-C50C-407E-A947-70E740481C1C}">
-                    <a14:useLocalDpi xmlns:a14="http://schemas.microsoft.com/office/drawing/2010/main" val="0"/>
+                    <a14:useLocalDpi xmlns:a14="http://schemas.microsoft.com/office/drawing/2010/main" xmlns="" val="0"/>
                   </a:ext>
                 </a:extLst>
               </a:blip>
@@ -15646,7 +15690,7 @@
               </a:effectLst>
               <a:extLst>
                 <a:ext uri="{909E8E84-426E-40DD-AFC4-6F175D3DCCD1}">
-                  <a14:hiddenFill xmlns:a14="http://schemas.microsoft.com/office/drawing/2010/main">
+                  <a14:hiddenFill xmlns:a14="http://schemas.microsoft.com/office/drawing/2010/main" xmlns="">
                     <a:solidFill>
                       <a:srgbClr val="FFFFFF"/>
                     </a:solidFill>
@@ -15715,7 +15759,7 @@
               <a:blip r:embed="rId13" cstate="print">
                 <a:extLst>
                   <a:ext uri="{28A0092B-C50C-407E-A947-70E740481C1C}">
-                    <a14:useLocalDpi xmlns:a14="http://schemas.microsoft.com/office/drawing/2010/main" val="0"/>
+                    <a14:useLocalDpi xmlns:a14="http://schemas.microsoft.com/office/drawing/2010/main" xmlns="" val="0"/>
                   </a:ext>
                 </a:extLst>
               </a:blip>
@@ -15742,7 +15786,7 @@
               </a:effectLst>
               <a:extLst>
                 <a:ext uri="{909E8E84-426E-40DD-AFC4-6F175D3DCCD1}">
-                  <a14:hiddenFill xmlns:a14="http://schemas.microsoft.com/office/drawing/2010/main">
+                  <a14:hiddenFill xmlns:a14="http://schemas.microsoft.com/office/drawing/2010/main" xmlns="">
                     <a:solidFill>
                       <a:srgbClr val="FFFFFF"/>
                     </a:solidFill>
@@ -15811,7 +15855,7 @@
               <a:blip r:embed="rId13" cstate="print">
                 <a:extLst>
                   <a:ext uri="{28A0092B-C50C-407E-A947-70E740481C1C}">
-                    <a14:useLocalDpi xmlns:a14="http://schemas.microsoft.com/office/drawing/2010/main" val="0"/>
+                    <a14:useLocalDpi xmlns:a14="http://schemas.microsoft.com/office/drawing/2010/main" xmlns="" val="0"/>
                   </a:ext>
                 </a:extLst>
               </a:blip>
@@ -15838,7 +15882,7 @@
               </a:effectLst>
               <a:extLst>
                 <a:ext uri="{909E8E84-426E-40DD-AFC4-6F175D3DCCD1}">
-                  <a14:hiddenFill xmlns:a14="http://schemas.microsoft.com/office/drawing/2010/main">
+                  <a14:hiddenFill xmlns:a14="http://schemas.microsoft.com/office/drawing/2010/main" xmlns="">
                     <a:solidFill>
                       <a:srgbClr val="FFFFFF"/>
                     </a:solidFill>
@@ -15860,7 +15904,7 @@
             <a:blip r:embed="rId14" cstate="print">
               <a:extLst>
                 <a:ext uri="{28A0092B-C50C-407E-A947-70E740481C1C}">
-                  <a14:useLocalDpi xmlns:a14="http://schemas.microsoft.com/office/drawing/2010/main" val="0"/>
+                  <a14:useLocalDpi xmlns:a14="http://schemas.microsoft.com/office/drawing/2010/main" xmlns="" val="0"/>
                 </a:ext>
               </a:extLst>
             </a:blip>
@@ -15880,7 +15924,7 @@
             <a:noFill/>
             <a:extLst>
               <a:ext uri="{909E8E84-426E-40DD-AFC4-6F175D3DCCD1}">
-                <a14:hiddenFill xmlns:a14="http://schemas.microsoft.com/office/drawing/2010/main">
+                <a14:hiddenFill xmlns:a14="http://schemas.microsoft.com/office/drawing/2010/main" xmlns="">
                   <a:solidFill>
                     <a:srgbClr val="FFFFFF"/>
                   </a:solidFill>
@@ -15901,7 +15945,7 @@
             <a:blip r:embed="rId15" cstate="print">
               <a:extLst>
                 <a:ext uri="{28A0092B-C50C-407E-A947-70E740481C1C}">
-                  <a14:useLocalDpi xmlns:a14="http://schemas.microsoft.com/office/drawing/2010/main" val="0"/>
+                  <a14:useLocalDpi xmlns:a14="http://schemas.microsoft.com/office/drawing/2010/main" xmlns="" val="0"/>
                 </a:ext>
               </a:extLst>
             </a:blip>
@@ -15921,7 +15965,7 @@
             <a:noFill/>
             <a:extLst>
               <a:ext uri="{909E8E84-426E-40DD-AFC4-6F175D3DCCD1}">
-                <a14:hiddenFill xmlns:a14="http://schemas.microsoft.com/office/drawing/2010/main">
+                <a14:hiddenFill xmlns:a14="http://schemas.microsoft.com/office/drawing/2010/main" xmlns="">
                   <a:solidFill>
                     <a:srgbClr val="FFFFFF"/>
                   </a:solidFill>
@@ -15942,7 +15986,7 @@
             <a:blip r:embed="rId16" cstate="print">
               <a:extLst>
                 <a:ext uri="{28A0092B-C50C-407E-A947-70E740481C1C}">
-                  <a14:useLocalDpi xmlns:a14="http://schemas.microsoft.com/office/drawing/2010/main" val="0"/>
+                  <a14:useLocalDpi xmlns:a14="http://schemas.microsoft.com/office/drawing/2010/main" xmlns="" val="0"/>
                 </a:ext>
               </a:extLst>
             </a:blip>
@@ -15962,7 +16006,7 @@
             <a:noFill/>
             <a:extLst>
               <a:ext uri="{909E8E84-426E-40DD-AFC4-6F175D3DCCD1}">
-                <a14:hiddenFill xmlns:a14="http://schemas.microsoft.com/office/drawing/2010/main">
+                <a14:hiddenFill xmlns:a14="http://schemas.microsoft.com/office/drawing/2010/main" xmlns="">
                   <a:solidFill>
                     <a:srgbClr val="FFFFFF"/>
                   </a:solidFill>
@@ -15983,7 +16027,7 @@
             <a:blip r:embed="rId17" cstate="print">
               <a:extLst>
                 <a:ext uri="{28A0092B-C50C-407E-A947-70E740481C1C}">
-                  <a14:useLocalDpi xmlns:a14="http://schemas.microsoft.com/office/drawing/2010/main" val="0"/>
+                  <a14:useLocalDpi xmlns:a14="http://schemas.microsoft.com/office/drawing/2010/main" xmlns="" val="0"/>
                 </a:ext>
               </a:extLst>
             </a:blip>
@@ -16003,7 +16047,7 @@
             <a:noFill/>
             <a:extLst>
               <a:ext uri="{909E8E84-426E-40DD-AFC4-6F175D3DCCD1}">
-                <a14:hiddenFill xmlns:a14="http://schemas.microsoft.com/office/drawing/2010/main">
+                <a14:hiddenFill xmlns:a14="http://schemas.microsoft.com/office/drawing/2010/main" xmlns="">
                   <a:solidFill>
                     <a:srgbClr val="FFFFFF"/>
                   </a:solidFill>
@@ -16153,7 +16197,7 @@
             <a:blip r:embed="rId7" cstate="print">
               <a:extLst>
                 <a:ext uri="{28A0092B-C50C-407E-A947-70E740481C1C}">
-                  <a14:useLocalDpi xmlns:a14="http://schemas.microsoft.com/office/drawing/2010/main" val="0"/>
+                  <a14:useLocalDpi xmlns:a14="http://schemas.microsoft.com/office/drawing/2010/main" xmlns="" val="0"/>
                 </a:ext>
               </a:extLst>
             </a:blip>
@@ -16197,7 +16241,7 @@
             <a:blip r:embed="rId8" cstate="print">
               <a:extLst>
                 <a:ext uri="{28A0092B-C50C-407E-A947-70E740481C1C}">
-                  <a14:useLocalDpi xmlns:a14="http://schemas.microsoft.com/office/drawing/2010/main" val="0"/>
+                  <a14:useLocalDpi xmlns:a14="http://schemas.microsoft.com/office/drawing/2010/main" xmlns="" val="0"/>
                 </a:ext>
               </a:extLst>
             </a:blip>
@@ -16241,7 +16285,7 @@
             <a:blip r:embed="rId9" cstate="print">
               <a:extLst>
                 <a:ext uri="{28A0092B-C50C-407E-A947-70E740481C1C}">
-                  <a14:useLocalDpi xmlns:a14="http://schemas.microsoft.com/office/drawing/2010/main" val="0"/>
+                  <a14:useLocalDpi xmlns:a14="http://schemas.microsoft.com/office/drawing/2010/main" xmlns="" val="0"/>
                 </a:ext>
               </a:extLst>
             </a:blip>
@@ -16285,7 +16329,7 @@
             <a:blip r:embed="rId10" cstate="print">
               <a:extLst>
                 <a:ext uri="{28A0092B-C50C-407E-A947-70E740481C1C}">
-                  <a14:useLocalDpi xmlns:a14="http://schemas.microsoft.com/office/drawing/2010/main" val="0"/>
+                  <a14:useLocalDpi xmlns:a14="http://schemas.microsoft.com/office/drawing/2010/main" xmlns="" val="0"/>
                 </a:ext>
               </a:extLst>
             </a:blip>
@@ -16329,7 +16373,7 @@
             <a:blip r:embed="rId11" cstate="print">
               <a:extLst>
                 <a:ext uri="{28A0092B-C50C-407E-A947-70E740481C1C}">
-                  <a14:useLocalDpi xmlns:a14="http://schemas.microsoft.com/office/drawing/2010/main" val="0"/>
+                  <a14:useLocalDpi xmlns:a14="http://schemas.microsoft.com/office/drawing/2010/main" xmlns="" val="0"/>
                 </a:ext>
               </a:extLst>
             </a:blip>
@@ -16367,7 +16411,7 @@
     </p:spTree>
     <p:extLst>
       <p:ext uri="{BB962C8B-B14F-4D97-AF65-F5344CB8AC3E}">
-        <p14:creationId xmlns:p14="http://schemas.microsoft.com/office/powerpoint/2010/main" val="3129907982"/>
+        <p14:creationId xmlns:p14="http://schemas.microsoft.com/office/powerpoint/2010/main" xmlns="" val="3129907982"/>
       </p:ext>
     </p:extLst>
   </p:cSld>

</xml_diff>

<commit_message>
Fixed another typo in the same figure.
</commit_message>
<xml_diff>
--- a/wiki/tutorial/2 - Quantification/2.0 - Introduction/illustrations/illustrations.pptx
+++ b/wiki/tutorial/2 - Quantification/2.0 - Introduction/illustrations/illustrations.pptx
@@ -8754,8 +8754,8 @@
         </p:nvSpPr>
         <p:spPr>
           <a:xfrm>
-            <a:off x="342816" y="56444"/>
-            <a:ext cx="1586396" cy="276999"/>
+            <a:off x="325183" y="56444"/>
+            <a:ext cx="1621662" cy="276999"/>
           </a:xfrm>
           <a:prstGeom prst="rect">
             <a:avLst/>
@@ -8777,7 +8777,17 @@
                   </a:schemeClr>
                 </a:solidFill>
               </a:rPr>
-              <a:t>A- Metabolic </a:t>
+              <a:t>A - </a:t>
+            </a:r>
+            <a:r>
+              <a:rPr lang="nb-NO" sz="1200" b="1" dirty="0" smtClean="0">
+                <a:solidFill>
+                  <a:schemeClr val="tx2">
+                    <a:lumMod val="75000"/>
+                  </a:schemeClr>
+                </a:solidFill>
+              </a:rPr>
+              <a:t>Metabolic </a:t>
             </a:r>
             <a:r>
               <a:rPr lang="nb-NO" sz="1200" b="1" dirty="0" err="1" smtClean="0">
@@ -8807,8 +8817,8 @@
         </p:nvSpPr>
         <p:spPr>
           <a:xfrm>
-            <a:off x="2743385" y="56456"/>
-            <a:ext cx="1517468" cy="276999"/>
+            <a:off x="2725753" y="56456"/>
+            <a:ext cx="1552733" cy="276999"/>
           </a:xfrm>
           <a:prstGeom prst="rect">
             <a:avLst/>
@@ -8830,7 +8840,17 @@
                   </a:schemeClr>
                 </a:solidFill>
               </a:rPr>
-              <a:t>B- Chemical </a:t>
+              <a:t>B - </a:t>
+            </a:r>
+            <a:r>
+              <a:rPr lang="nb-NO" sz="1200" b="1" dirty="0" smtClean="0">
+                <a:solidFill>
+                  <a:schemeClr val="tx2">
+                    <a:lumMod val="75000"/>
+                  </a:schemeClr>
+                </a:solidFill>
+              </a:rPr>
+              <a:t>Chemical </a:t>
             </a:r>
             <a:r>
               <a:rPr lang="nb-NO" sz="1200" b="1" dirty="0" err="1" smtClean="0">
@@ -12153,8 +12173,8 @@
         </p:nvSpPr>
         <p:spPr>
           <a:xfrm>
-            <a:off x="5208486" y="56443"/>
-            <a:ext cx="982833" cy="276999"/>
+            <a:off x="5193257" y="56443"/>
+            <a:ext cx="1013291" cy="276999"/>
           </a:xfrm>
           <a:prstGeom prst="rect">
             <a:avLst/>
@@ -12176,7 +12196,17 @@
                   </a:schemeClr>
                 </a:solidFill>
               </a:rPr>
-              <a:t>B- </a:t>
+              <a:t>C </a:t>
+            </a:r>
+            <a:r>
+              <a:rPr lang="nb-NO" sz="1200" b="1" dirty="0" smtClean="0">
+                <a:solidFill>
+                  <a:schemeClr val="tx2">
+                    <a:lumMod val="75000"/>
+                  </a:schemeClr>
+                </a:solidFill>
+              </a:rPr>
+              <a:t>- </a:t>
             </a:r>
             <a:r>
               <a:rPr lang="nb-NO" sz="1200" b="1" dirty="0" err="1" smtClean="0">

</xml_diff>